<commit_message>
Improved result and PPTX
</commit_message>
<xml_diff>
--- a/new/Estudo Modelagem Bifocal.pptx
+++ b/new/Estudo Modelagem Bifocal.pptx
@@ -150,7 +150,7 @@
           <p:cNvPr id="2" name="Título 1">
             <a:extLst>
               <a:ext uri="{FF2B5EF4-FFF2-40B4-BE49-F238E27FC236}">
-                <a16:creationId xmlns:a16="http://schemas.microsoft.com/office/drawing/2014/main" xmlns="" id="{87DEBEBF-985D-4615-9F76-95033545A44F}"/>
+                <a16:creationId xmlns:a16="http://schemas.microsoft.com/office/drawing/2014/main" id="{87DEBEBF-985D-4615-9F76-95033545A44F}"/>
               </a:ext>
             </a:extLst>
           </p:cNvPr>
@@ -187,7 +187,7 @@
           <p:cNvPr id="3" name="Subtítulo 2">
             <a:extLst>
               <a:ext uri="{FF2B5EF4-FFF2-40B4-BE49-F238E27FC236}">
-                <a16:creationId xmlns:a16="http://schemas.microsoft.com/office/drawing/2014/main" xmlns="" id="{35A7ECD7-12EC-4522-B7CE-9F55448628E8}"/>
+                <a16:creationId xmlns:a16="http://schemas.microsoft.com/office/drawing/2014/main" id="{35A7ECD7-12EC-4522-B7CE-9F55448628E8}"/>
               </a:ext>
             </a:extLst>
           </p:cNvPr>
@@ -257,7 +257,7 @@
           <p:cNvPr id="4" name="Espaço Reservado para Data 3">
             <a:extLst>
               <a:ext uri="{FF2B5EF4-FFF2-40B4-BE49-F238E27FC236}">
-                <a16:creationId xmlns:a16="http://schemas.microsoft.com/office/drawing/2014/main" xmlns="" id="{DD43A961-52A4-4054-B83F-84014DE67E2D}"/>
+                <a16:creationId xmlns:a16="http://schemas.microsoft.com/office/drawing/2014/main" id="{DD43A961-52A4-4054-B83F-84014DE67E2D}"/>
               </a:ext>
             </a:extLst>
           </p:cNvPr>
@@ -275,7 +275,7 @@
           <a:p>
             <a:fld id="{87AC05A1-1DFA-4BA5-BCC4-076DF4D4C95B}" type="datetimeFigureOut">
               <a:rPr lang="pt-BR" smtClean="0"/>
-              <a:t>13/11/2017</a:t>
+              <a:t>14/11/2017</a:t>
             </a:fld>
             <a:endParaRPr lang="pt-BR"/>
           </a:p>
@@ -286,7 +286,7 @@
           <p:cNvPr id="5" name="Espaço Reservado para Rodapé 4">
             <a:extLst>
               <a:ext uri="{FF2B5EF4-FFF2-40B4-BE49-F238E27FC236}">
-                <a16:creationId xmlns:a16="http://schemas.microsoft.com/office/drawing/2014/main" xmlns="" id="{67120999-3AD8-4901-90DE-DE25726368F9}"/>
+                <a16:creationId xmlns:a16="http://schemas.microsoft.com/office/drawing/2014/main" id="{67120999-3AD8-4901-90DE-DE25726368F9}"/>
               </a:ext>
             </a:extLst>
           </p:cNvPr>
@@ -311,7 +311,7 @@
           <p:cNvPr id="6" name="Espaço Reservado para Número de Slide 5">
             <a:extLst>
               <a:ext uri="{FF2B5EF4-FFF2-40B4-BE49-F238E27FC236}">
-                <a16:creationId xmlns:a16="http://schemas.microsoft.com/office/drawing/2014/main" xmlns="" id="{6FA5AF6A-5D99-44FD-94C8-690D3389B4E3}"/>
+                <a16:creationId xmlns:a16="http://schemas.microsoft.com/office/drawing/2014/main" id="{6FA5AF6A-5D99-44FD-94C8-690D3389B4E3}"/>
               </a:ext>
             </a:extLst>
           </p:cNvPr>
@@ -370,7 +370,7 @@
           <p:cNvPr id="2" name="Título 1">
             <a:extLst>
               <a:ext uri="{FF2B5EF4-FFF2-40B4-BE49-F238E27FC236}">
-                <a16:creationId xmlns:a16="http://schemas.microsoft.com/office/drawing/2014/main" xmlns="" id="{76D7B88C-BDF8-45EC-9315-D4A2499DF1CF}"/>
+                <a16:creationId xmlns:a16="http://schemas.microsoft.com/office/drawing/2014/main" id="{76D7B88C-BDF8-45EC-9315-D4A2499DF1CF}"/>
               </a:ext>
             </a:extLst>
           </p:cNvPr>
@@ -398,7 +398,7 @@
           <p:cNvPr id="3" name="Espaço Reservado para Texto Vertical 2">
             <a:extLst>
               <a:ext uri="{FF2B5EF4-FFF2-40B4-BE49-F238E27FC236}">
-                <a16:creationId xmlns:a16="http://schemas.microsoft.com/office/drawing/2014/main" xmlns="" id="{B1BC31B8-1843-4E04-AAF0-3ED3CE29187A}"/>
+                <a16:creationId xmlns:a16="http://schemas.microsoft.com/office/drawing/2014/main" id="{B1BC31B8-1843-4E04-AAF0-3ED3CE29187A}"/>
               </a:ext>
             </a:extLst>
           </p:cNvPr>
@@ -455,7 +455,7 @@
           <p:cNvPr id="4" name="Espaço Reservado para Data 3">
             <a:extLst>
               <a:ext uri="{FF2B5EF4-FFF2-40B4-BE49-F238E27FC236}">
-                <a16:creationId xmlns:a16="http://schemas.microsoft.com/office/drawing/2014/main" xmlns="" id="{82B1757E-5495-4237-9F09-1234FCE4430B}"/>
+                <a16:creationId xmlns:a16="http://schemas.microsoft.com/office/drawing/2014/main" id="{82B1757E-5495-4237-9F09-1234FCE4430B}"/>
               </a:ext>
             </a:extLst>
           </p:cNvPr>
@@ -473,7 +473,7 @@
           <a:p>
             <a:fld id="{87AC05A1-1DFA-4BA5-BCC4-076DF4D4C95B}" type="datetimeFigureOut">
               <a:rPr lang="pt-BR" smtClean="0"/>
-              <a:t>13/11/2017</a:t>
+              <a:t>14/11/2017</a:t>
             </a:fld>
             <a:endParaRPr lang="pt-BR"/>
           </a:p>
@@ -484,7 +484,7 @@
           <p:cNvPr id="5" name="Espaço Reservado para Rodapé 4">
             <a:extLst>
               <a:ext uri="{FF2B5EF4-FFF2-40B4-BE49-F238E27FC236}">
-                <a16:creationId xmlns:a16="http://schemas.microsoft.com/office/drawing/2014/main" xmlns="" id="{CAF536F8-C6EC-48BE-8B13-E6500AB6C145}"/>
+                <a16:creationId xmlns:a16="http://schemas.microsoft.com/office/drawing/2014/main" id="{CAF536F8-C6EC-48BE-8B13-E6500AB6C145}"/>
               </a:ext>
             </a:extLst>
           </p:cNvPr>
@@ -509,7 +509,7 @@
           <p:cNvPr id="6" name="Espaço Reservado para Número de Slide 5">
             <a:extLst>
               <a:ext uri="{FF2B5EF4-FFF2-40B4-BE49-F238E27FC236}">
-                <a16:creationId xmlns:a16="http://schemas.microsoft.com/office/drawing/2014/main" xmlns="" id="{E4B7FB04-DD1E-452E-9B89-B109ADC6FC32}"/>
+                <a16:creationId xmlns:a16="http://schemas.microsoft.com/office/drawing/2014/main" id="{E4B7FB04-DD1E-452E-9B89-B109ADC6FC32}"/>
               </a:ext>
             </a:extLst>
           </p:cNvPr>
@@ -568,7 +568,7 @@
           <p:cNvPr id="2" name="Título Vertical 1">
             <a:extLst>
               <a:ext uri="{FF2B5EF4-FFF2-40B4-BE49-F238E27FC236}">
-                <a16:creationId xmlns:a16="http://schemas.microsoft.com/office/drawing/2014/main" xmlns="" id="{6B024CB0-64C6-49A6-A4F2-E6263A9C5887}"/>
+                <a16:creationId xmlns:a16="http://schemas.microsoft.com/office/drawing/2014/main" id="{6B024CB0-64C6-49A6-A4F2-E6263A9C5887}"/>
               </a:ext>
             </a:extLst>
           </p:cNvPr>
@@ -601,7 +601,7 @@
           <p:cNvPr id="3" name="Espaço Reservado para Texto Vertical 2">
             <a:extLst>
               <a:ext uri="{FF2B5EF4-FFF2-40B4-BE49-F238E27FC236}">
-                <a16:creationId xmlns:a16="http://schemas.microsoft.com/office/drawing/2014/main" xmlns="" id="{A89F69E4-E22E-4A30-BB3C-E7F4FAF6F207}"/>
+                <a16:creationId xmlns:a16="http://schemas.microsoft.com/office/drawing/2014/main" id="{A89F69E4-E22E-4A30-BB3C-E7F4FAF6F207}"/>
               </a:ext>
             </a:extLst>
           </p:cNvPr>
@@ -663,7 +663,7 @@
           <p:cNvPr id="4" name="Espaço Reservado para Data 3">
             <a:extLst>
               <a:ext uri="{FF2B5EF4-FFF2-40B4-BE49-F238E27FC236}">
-                <a16:creationId xmlns:a16="http://schemas.microsoft.com/office/drawing/2014/main" xmlns="" id="{2EEB5558-0A7F-46D9-B0F5-16CB79843FE7}"/>
+                <a16:creationId xmlns:a16="http://schemas.microsoft.com/office/drawing/2014/main" id="{2EEB5558-0A7F-46D9-B0F5-16CB79843FE7}"/>
               </a:ext>
             </a:extLst>
           </p:cNvPr>
@@ -681,7 +681,7 @@
           <a:p>
             <a:fld id="{87AC05A1-1DFA-4BA5-BCC4-076DF4D4C95B}" type="datetimeFigureOut">
               <a:rPr lang="pt-BR" smtClean="0"/>
-              <a:t>13/11/2017</a:t>
+              <a:t>14/11/2017</a:t>
             </a:fld>
             <a:endParaRPr lang="pt-BR"/>
           </a:p>
@@ -692,7 +692,7 @@
           <p:cNvPr id="5" name="Espaço Reservado para Rodapé 4">
             <a:extLst>
               <a:ext uri="{FF2B5EF4-FFF2-40B4-BE49-F238E27FC236}">
-                <a16:creationId xmlns:a16="http://schemas.microsoft.com/office/drawing/2014/main" xmlns="" id="{5C7AD8DC-F543-40EC-9BA5-FF4F8C5C7470}"/>
+                <a16:creationId xmlns:a16="http://schemas.microsoft.com/office/drawing/2014/main" id="{5C7AD8DC-F543-40EC-9BA5-FF4F8C5C7470}"/>
               </a:ext>
             </a:extLst>
           </p:cNvPr>
@@ -717,7 +717,7 @@
           <p:cNvPr id="6" name="Espaço Reservado para Número de Slide 5">
             <a:extLst>
               <a:ext uri="{FF2B5EF4-FFF2-40B4-BE49-F238E27FC236}">
-                <a16:creationId xmlns:a16="http://schemas.microsoft.com/office/drawing/2014/main" xmlns="" id="{501E63D7-158D-4CEE-A86A-79017A09C076}"/>
+                <a16:creationId xmlns:a16="http://schemas.microsoft.com/office/drawing/2014/main" id="{501E63D7-158D-4CEE-A86A-79017A09C076}"/>
               </a:ext>
             </a:extLst>
           </p:cNvPr>
@@ -776,7 +776,7 @@
           <p:cNvPr id="2" name="Título 1">
             <a:extLst>
               <a:ext uri="{FF2B5EF4-FFF2-40B4-BE49-F238E27FC236}">
-                <a16:creationId xmlns:a16="http://schemas.microsoft.com/office/drawing/2014/main" xmlns="" id="{6CD6AD03-9265-4857-91DA-D775DD67803D}"/>
+                <a16:creationId xmlns:a16="http://schemas.microsoft.com/office/drawing/2014/main" id="{6CD6AD03-9265-4857-91DA-D775DD67803D}"/>
               </a:ext>
             </a:extLst>
           </p:cNvPr>
@@ -804,7 +804,7 @@
           <p:cNvPr id="3" name="Espaço Reservado para Conteúdo 2">
             <a:extLst>
               <a:ext uri="{FF2B5EF4-FFF2-40B4-BE49-F238E27FC236}">
-                <a16:creationId xmlns:a16="http://schemas.microsoft.com/office/drawing/2014/main" xmlns="" id="{714B8031-5C3C-46DD-AE8E-FB7E15392605}"/>
+                <a16:creationId xmlns:a16="http://schemas.microsoft.com/office/drawing/2014/main" id="{714B8031-5C3C-46DD-AE8E-FB7E15392605}"/>
               </a:ext>
             </a:extLst>
           </p:cNvPr>
@@ -861,7 +861,7 @@
           <p:cNvPr id="4" name="Espaço Reservado para Data 3">
             <a:extLst>
               <a:ext uri="{FF2B5EF4-FFF2-40B4-BE49-F238E27FC236}">
-                <a16:creationId xmlns:a16="http://schemas.microsoft.com/office/drawing/2014/main" xmlns="" id="{CD835D7A-8723-4850-B81F-C67481FCE8C6}"/>
+                <a16:creationId xmlns:a16="http://schemas.microsoft.com/office/drawing/2014/main" id="{CD835D7A-8723-4850-B81F-C67481FCE8C6}"/>
               </a:ext>
             </a:extLst>
           </p:cNvPr>
@@ -879,7 +879,7 @@
           <a:p>
             <a:fld id="{87AC05A1-1DFA-4BA5-BCC4-076DF4D4C95B}" type="datetimeFigureOut">
               <a:rPr lang="pt-BR" smtClean="0"/>
-              <a:t>13/11/2017</a:t>
+              <a:t>14/11/2017</a:t>
             </a:fld>
             <a:endParaRPr lang="pt-BR"/>
           </a:p>
@@ -890,7 +890,7 @@
           <p:cNvPr id="5" name="Espaço Reservado para Rodapé 4">
             <a:extLst>
               <a:ext uri="{FF2B5EF4-FFF2-40B4-BE49-F238E27FC236}">
-                <a16:creationId xmlns:a16="http://schemas.microsoft.com/office/drawing/2014/main" xmlns="" id="{F1BEC501-BB84-49FC-B81F-693DD7B5B70F}"/>
+                <a16:creationId xmlns:a16="http://schemas.microsoft.com/office/drawing/2014/main" id="{F1BEC501-BB84-49FC-B81F-693DD7B5B70F}"/>
               </a:ext>
             </a:extLst>
           </p:cNvPr>
@@ -915,7 +915,7 @@
           <p:cNvPr id="6" name="Espaço Reservado para Número de Slide 5">
             <a:extLst>
               <a:ext uri="{FF2B5EF4-FFF2-40B4-BE49-F238E27FC236}">
-                <a16:creationId xmlns:a16="http://schemas.microsoft.com/office/drawing/2014/main" xmlns="" id="{0F1C3794-E857-460A-B01B-BB2DADF85F51}"/>
+                <a16:creationId xmlns:a16="http://schemas.microsoft.com/office/drawing/2014/main" id="{0F1C3794-E857-460A-B01B-BB2DADF85F51}"/>
               </a:ext>
             </a:extLst>
           </p:cNvPr>
@@ -974,7 +974,7 @@
           <p:cNvPr id="2" name="Título 1">
             <a:extLst>
               <a:ext uri="{FF2B5EF4-FFF2-40B4-BE49-F238E27FC236}">
-                <a16:creationId xmlns:a16="http://schemas.microsoft.com/office/drawing/2014/main" xmlns="" id="{EEFD2DFB-8732-4249-A66B-FF894F3D34B5}"/>
+                <a16:creationId xmlns:a16="http://schemas.microsoft.com/office/drawing/2014/main" id="{EEFD2DFB-8732-4249-A66B-FF894F3D34B5}"/>
               </a:ext>
             </a:extLst>
           </p:cNvPr>
@@ -1011,7 +1011,7 @@
           <p:cNvPr id="3" name="Espaço Reservado para Texto 2">
             <a:extLst>
               <a:ext uri="{FF2B5EF4-FFF2-40B4-BE49-F238E27FC236}">
-                <a16:creationId xmlns:a16="http://schemas.microsoft.com/office/drawing/2014/main" xmlns="" id="{C6B07124-6CA2-446D-B2CB-BF2F212751D3}"/>
+                <a16:creationId xmlns:a16="http://schemas.microsoft.com/office/drawing/2014/main" id="{C6B07124-6CA2-446D-B2CB-BF2F212751D3}"/>
               </a:ext>
             </a:extLst>
           </p:cNvPr>
@@ -1136,7 +1136,7 @@
           <p:cNvPr id="4" name="Espaço Reservado para Data 3">
             <a:extLst>
               <a:ext uri="{FF2B5EF4-FFF2-40B4-BE49-F238E27FC236}">
-                <a16:creationId xmlns:a16="http://schemas.microsoft.com/office/drawing/2014/main" xmlns="" id="{0BDD990C-F37A-4BBD-9253-0C12A6CEE580}"/>
+                <a16:creationId xmlns:a16="http://schemas.microsoft.com/office/drawing/2014/main" id="{0BDD990C-F37A-4BBD-9253-0C12A6CEE580}"/>
               </a:ext>
             </a:extLst>
           </p:cNvPr>
@@ -1154,7 +1154,7 @@
           <a:p>
             <a:fld id="{87AC05A1-1DFA-4BA5-BCC4-076DF4D4C95B}" type="datetimeFigureOut">
               <a:rPr lang="pt-BR" smtClean="0"/>
-              <a:t>13/11/2017</a:t>
+              <a:t>14/11/2017</a:t>
             </a:fld>
             <a:endParaRPr lang="pt-BR"/>
           </a:p>
@@ -1165,7 +1165,7 @@
           <p:cNvPr id="5" name="Espaço Reservado para Rodapé 4">
             <a:extLst>
               <a:ext uri="{FF2B5EF4-FFF2-40B4-BE49-F238E27FC236}">
-                <a16:creationId xmlns:a16="http://schemas.microsoft.com/office/drawing/2014/main" xmlns="" id="{EF3420E6-FBBE-4FEC-8B31-D8DFFBF30FCE}"/>
+                <a16:creationId xmlns:a16="http://schemas.microsoft.com/office/drawing/2014/main" id="{EF3420E6-FBBE-4FEC-8B31-D8DFFBF30FCE}"/>
               </a:ext>
             </a:extLst>
           </p:cNvPr>
@@ -1190,7 +1190,7 @@
           <p:cNvPr id="6" name="Espaço Reservado para Número de Slide 5">
             <a:extLst>
               <a:ext uri="{FF2B5EF4-FFF2-40B4-BE49-F238E27FC236}">
-                <a16:creationId xmlns:a16="http://schemas.microsoft.com/office/drawing/2014/main" xmlns="" id="{CDEAFF5D-BD99-4477-A172-D497F352778C}"/>
+                <a16:creationId xmlns:a16="http://schemas.microsoft.com/office/drawing/2014/main" id="{CDEAFF5D-BD99-4477-A172-D497F352778C}"/>
               </a:ext>
             </a:extLst>
           </p:cNvPr>
@@ -1249,7 +1249,7 @@
           <p:cNvPr id="2" name="Título 1">
             <a:extLst>
               <a:ext uri="{FF2B5EF4-FFF2-40B4-BE49-F238E27FC236}">
-                <a16:creationId xmlns:a16="http://schemas.microsoft.com/office/drawing/2014/main" xmlns="" id="{1103C17C-5380-416F-A89A-0B1BB52BF44D}"/>
+                <a16:creationId xmlns:a16="http://schemas.microsoft.com/office/drawing/2014/main" id="{1103C17C-5380-416F-A89A-0B1BB52BF44D}"/>
               </a:ext>
             </a:extLst>
           </p:cNvPr>
@@ -1277,7 +1277,7 @@
           <p:cNvPr id="3" name="Espaço Reservado para Conteúdo 2">
             <a:extLst>
               <a:ext uri="{FF2B5EF4-FFF2-40B4-BE49-F238E27FC236}">
-                <a16:creationId xmlns:a16="http://schemas.microsoft.com/office/drawing/2014/main" xmlns="" id="{5D3BAE15-D4F5-4BA6-9798-F37F5071F1BC}"/>
+                <a16:creationId xmlns:a16="http://schemas.microsoft.com/office/drawing/2014/main" id="{5D3BAE15-D4F5-4BA6-9798-F37F5071F1BC}"/>
               </a:ext>
             </a:extLst>
           </p:cNvPr>
@@ -1339,7 +1339,7 @@
           <p:cNvPr id="4" name="Espaço Reservado para Conteúdo 3">
             <a:extLst>
               <a:ext uri="{FF2B5EF4-FFF2-40B4-BE49-F238E27FC236}">
-                <a16:creationId xmlns:a16="http://schemas.microsoft.com/office/drawing/2014/main" xmlns="" id="{99004A88-D486-4DDE-B7C3-E7C122C8583E}"/>
+                <a16:creationId xmlns:a16="http://schemas.microsoft.com/office/drawing/2014/main" id="{99004A88-D486-4DDE-B7C3-E7C122C8583E}"/>
               </a:ext>
             </a:extLst>
           </p:cNvPr>
@@ -1401,7 +1401,7 @@
           <p:cNvPr id="5" name="Espaço Reservado para Data 4">
             <a:extLst>
               <a:ext uri="{FF2B5EF4-FFF2-40B4-BE49-F238E27FC236}">
-                <a16:creationId xmlns:a16="http://schemas.microsoft.com/office/drawing/2014/main" xmlns="" id="{DD4F1D82-D14E-4F74-8AB4-181E7309AB21}"/>
+                <a16:creationId xmlns:a16="http://schemas.microsoft.com/office/drawing/2014/main" id="{DD4F1D82-D14E-4F74-8AB4-181E7309AB21}"/>
               </a:ext>
             </a:extLst>
           </p:cNvPr>
@@ -1419,7 +1419,7 @@
           <a:p>
             <a:fld id="{87AC05A1-1DFA-4BA5-BCC4-076DF4D4C95B}" type="datetimeFigureOut">
               <a:rPr lang="pt-BR" smtClean="0"/>
-              <a:t>13/11/2017</a:t>
+              <a:t>14/11/2017</a:t>
             </a:fld>
             <a:endParaRPr lang="pt-BR"/>
           </a:p>
@@ -1430,7 +1430,7 @@
           <p:cNvPr id="6" name="Espaço Reservado para Rodapé 5">
             <a:extLst>
               <a:ext uri="{FF2B5EF4-FFF2-40B4-BE49-F238E27FC236}">
-                <a16:creationId xmlns:a16="http://schemas.microsoft.com/office/drawing/2014/main" xmlns="" id="{44236936-A202-4E3B-9F8C-E1F60D780540}"/>
+                <a16:creationId xmlns:a16="http://schemas.microsoft.com/office/drawing/2014/main" id="{44236936-A202-4E3B-9F8C-E1F60D780540}"/>
               </a:ext>
             </a:extLst>
           </p:cNvPr>
@@ -1455,7 +1455,7 @@
           <p:cNvPr id="7" name="Espaço Reservado para Número de Slide 6">
             <a:extLst>
               <a:ext uri="{FF2B5EF4-FFF2-40B4-BE49-F238E27FC236}">
-                <a16:creationId xmlns:a16="http://schemas.microsoft.com/office/drawing/2014/main" xmlns="" id="{403BC5B1-0035-4717-83D0-1D93BA04EF4E}"/>
+                <a16:creationId xmlns:a16="http://schemas.microsoft.com/office/drawing/2014/main" id="{403BC5B1-0035-4717-83D0-1D93BA04EF4E}"/>
               </a:ext>
             </a:extLst>
           </p:cNvPr>
@@ -1514,7 +1514,7 @@
           <p:cNvPr id="2" name="Título 1">
             <a:extLst>
               <a:ext uri="{FF2B5EF4-FFF2-40B4-BE49-F238E27FC236}">
-                <a16:creationId xmlns:a16="http://schemas.microsoft.com/office/drawing/2014/main" xmlns="" id="{FE6BF21A-657A-4CF8-84BA-0070D5A7C273}"/>
+                <a16:creationId xmlns:a16="http://schemas.microsoft.com/office/drawing/2014/main" id="{FE6BF21A-657A-4CF8-84BA-0070D5A7C273}"/>
               </a:ext>
             </a:extLst>
           </p:cNvPr>
@@ -1547,7 +1547,7 @@
           <p:cNvPr id="3" name="Espaço Reservado para Texto 2">
             <a:extLst>
               <a:ext uri="{FF2B5EF4-FFF2-40B4-BE49-F238E27FC236}">
-                <a16:creationId xmlns:a16="http://schemas.microsoft.com/office/drawing/2014/main" xmlns="" id="{66F36467-F24E-45B1-95FC-460EE2F5CA93}"/>
+                <a16:creationId xmlns:a16="http://schemas.microsoft.com/office/drawing/2014/main" id="{66F36467-F24E-45B1-95FC-460EE2F5CA93}"/>
               </a:ext>
             </a:extLst>
           </p:cNvPr>
@@ -1618,7 +1618,7 @@
           <p:cNvPr id="4" name="Espaço Reservado para Conteúdo 3">
             <a:extLst>
               <a:ext uri="{FF2B5EF4-FFF2-40B4-BE49-F238E27FC236}">
-                <a16:creationId xmlns:a16="http://schemas.microsoft.com/office/drawing/2014/main" xmlns="" id="{A8E2D120-28B1-419E-B0D9-1A5E16C684C5}"/>
+                <a16:creationId xmlns:a16="http://schemas.microsoft.com/office/drawing/2014/main" id="{A8E2D120-28B1-419E-B0D9-1A5E16C684C5}"/>
               </a:ext>
             </a:extLst>
           </p:cNvPr>
@@ -1680,7 +1680,7 @@
           <p:cNvPr id="5" name="Espaço Reservado para Texto 4">
             <a:extLst>
               <a:ext uri="{FF2B5EF4-FFF2-40B4-BE49-F238E27FC236}">
-                <a16:creationId xmlns:a16="http://schemas.microsoft.com/office/drawing/2014/main" xmlns="" id="{925E3915-EB0B-467C-A200-09B7E5E1B484}"/>
+                <a16:creationId xmlns:a16="http://schemas.microsoft.com/office/drawing/2014/main" id="{925E3915-EB0B-467C-A200-09B7E5E1B484}"/>
               </a:ext>
             </a:extLst>
           </p:cNvPr>
@@ -1751,7 +1751,7 @@
           <p:cNvPr id="6" name="Espaço Reservado para Conteúdo 5">
             <a:extLst>
               <a:ext uri="{FF2B5EF4-FFF2-40B4-BE49-F238E27FC236}">
-                <a16:creationId xmlns:a16="http://schemas.microsoft.com/office/drawing/2014/main" xmlns="" id="{02488E2E-9C9B-4269-B520-E682509D30FA}"/>
+                <a16:creationId xmlns:a16="http://schemas.microsoft.com/office/drawing/2014/main" id="{02488E2E-9C9B-4269-B520-E682509D30FA}"/>
               </a:ext>
             </a:extLst>
           </p:cNvPr>
@@ -1813,7 +1813,7 @@
           <p:cNvPr id="7" name="Espaço Reservado para Data 6">
             <a:extLst>
               <a:ext uri="{FF2B5EF4-FFF2-40B4-BE49-F238E27FC236}">
-                <a16:creationId xmlns:a16="http://schemas.microsoft.com/office/drawing/2014/main" xmlns="" id="{91E40ED5-788C-4C4A-95DD-F6001EEC0706}"/>
+                <a16:creationId xmlns:a16="http://schemas.microsoft.com/office/drawing/2014/main" id="{91E40ED5-788C-4C4A-95DD-F6001EEC0706}"/>
               </a:ext>
             </a:extLst>
           </p:cNvPr>
@@ -1831,7 +1831,7 @@
           <a:p>
             <a:fld id="{87AC05A1-1DFA-4BA5-BCC4-076DF4D4C95B}" type="datetimeFigureOut">
               <a:rPr lang="pt-BR" smtClean="0"/>
-              <a:t>13/11/2017</a:t>
+              <a:t>14/11/2017</a:t>
             </a:fld>
             <a:endParaRPr lang="pt-BR"/>
           </a:p>
@@ -1842,7 +1842,7 @@
           <p:cNvPr id="8" name="Espaço Reservado para Rodapé 7">
             <a:extLst>
               <a:ext uri="{FF2B5EF4-FFF2-40B4-BE49-F238E27FC236}">
-                <a16:creationId xmlns:a16="http://schemas.microsoft.com/office/drawing/2014/main" xmlns="" id="{0492CED0-417F-4A1D-AADA-C3E252B0E6D6}"/>
+                <a16:creationId xmlns:a16="http://schemas.microsoft.com/office/drawing/2014/main" id="{0492CED0-417F-4A1D-AADA-C3E252B0E6D6}"/>
               </a:ext>
             </a:extLst>
           </p:cNvPr>
@@ -1867,7 +1867,7 @@
           <p:cNvPr id="9" name="Espaço Reservado para Número de Slide 8">
             <a:extLst>
               <a:ext uri="{FF2B5EF4-FFF2-40B4-BE49-F238E27FC236}">
-                <a16:creationId xmlns:a16="http://schemas.microsoft.com/office/drawing/2014/main" xmlns="" id="{B109721D-E1D6-4C3F-A807-ACAECAF4C79C}"/>
+                <a16:creationId xmlns:a16="http://schemas.microsoft.com/office/drawing/2014/main" id="{B109721D-E1D6-4C3F-A807-ACAECAF4C79C}"/>
               </a:ext>
             </a:extLst>
           </p:cNvPr>
@@ -1926,7 +1926,7 @@
           <p:cNvPr id="2" name="Título 1">
             <a:extLst>
               <a:ext uri="{FF2B5EF4-FFF2-40B4-BE49-F238E27FC236}">
-                <a16:creationId xmlns:a16="http://schemas.microsoft.com/office/drawing/2014/main" xmlns="" id="{2C9CF4F9-D8C4-4A67-A260-56461B7B0351}"/>
+                <a16:creationId xmlns:a16="http://schemas.microsoft.com/office/drawing/2014/main" id="{2C9CF4F9-D8C4-4A67-A260-56461B7B0351}"/>
               </a:ext>
             </a:extLst>
           </p:cNvPr>
@@ -1954,7 +1954,7 @@
           <p:cNvPr id="3" name="Espaço Reservado para Data 2">
             <a:extLst>
               <a:ext uri="{FF2B5EF4-FFF2-40B4-BE49-F238E27FC236}">
-                <a16:creationId xmlns:a16="http://schemas.microsoft.com/office/drawing/2014/main" xmlns="" id="{BFA36794-C0B3-4C11-89DD-468FB3C56242}"/>
+                <a16:creationId xmlns:a16="http://schemas.microsoft.com/office/drawing/2014/main" id="{BFA36794-C0B3-4C11-89DD-468FB3C56242}"/>
               </a:ext>
             </a:extLst>
           </p:cNvPr>
@@ -1972,7 +1972,7 @@
           <a:p>
             <a:fld id="{87AC05A1-1DFA-4BA5-BCC4-076DF4D4C95B}" type="datetimeFigureOut">
               <a:rPr lang="pt-BR" smtClean="0"/>
-              <a:t>13/11/2017</a:t>
+              <a:t>14/11/2017</a:t>
             </a:fld>
             <a:endParaRPr lang="pt-BR"/>
           </a:p>
@@ -1983,7 +1983,7 @@
           <p:cNvPr id="4" name="Espaço Reservado para Rodapé 3">
             <a:extLst>
               <a:ext uri="{FF2B5EF4-FFF2-40B4-BE49-F238E27FC236}">
-                <a16:creationId xmlns:a16="http://schemas.microsoft.com/office/drawing/2014/main" xmlns="" id="{80065C38-EC25-44D5-B395-75BB2FD687EE}"/>
+                <a16:creationId xmlns:a16="http://schemas.microsoft.com/office/drawing/2014/main" id="{80065C38-EC25-44D5-B395-75BB2FD687EE}"/>
               </a:ext>
             </a:extLst>
           </p:cNvPr>
@@ -2008,7 +2008,7 @@
           <p:cNvPr id="5" name="Espaço Reservado para Número de Slide 4">
             <a:extLst>
               <a:ext uri="{FF2B5EF4-FFF2-40B4-BE49-F238E27FC236}">
-                <a16:creationId xmlns:a16="http://schemas.microsoft.com/office/drawing/2014/main" xmlns="" id="{645ABE7A-53BE-4830-8A4E-5BFC0F1FEA2E}"/>
+                <a16:creationId xmlns:a16="http://schemas.microsoft.com/office/drawing/2014/main" id="{645ABE7A-53BE-4830-8A4E-5BFC0F1FEA2E}"/>
               </a:ext>
             </a:extLst>
           </p:cNvPr>
@@ -2067,7 +2067,7 @@
           <p:cNvPr id="2" name="Espaço Reservado para Data 1">
             <a:extLst>
               <a:ext uri="{FF2B5EF4-FFF2-40B4-BE49-F238E27FC236}">
-                <a16:creationId xmlns:a16="http://schemas.microsoft.com/office/drawing/2014/main" xmlns="" id="{6EDB3D82-CC0C-4E41-971C-A8E53850B0A7}"/>
+                <a16:creationId xmlns:a16="http://schemas.microsoft.com/office/drawing/2014/main" id="{6EDB3D82-CC0C-4E41-971C-A8E53850B0A7}"/>
               </a:ext>
             </a:extLst>
           </p:cNvPr>
@@ -2085,7 +2085,7 @@
           <a:p>
             <a:fld id="{87AC05A1-1DFA-4BA5-BCC4-076DF4D4C95B}" type="datetimeFigureOut">
               <a:rPr lang="pt-BR" smtClean="0"/>
-              <a:t>13/11/2017</a:t>
+              <a:t>14/11/2017</a:t>
             </a:fld>
             <a:endParaRPr lang="pt-BR"/>
           </a:p>
@@ -2096,7 +2096,7 @@
           <p:cNvPr id="3" name="Espaço Reservado para Rodapé 2">
             <a:extLst>
               <a:ext uri="{FF2B5EF4-FFF2-40B4-BE49-F238E27FC236}">
-                <a16:creationId xmlns:a16="http://schemas.microsoft.com/office/drawing/2014/main" xmlns="" id="{0D6C0BA6-711E-456A-AD4A-69EB97B94C9B}"/>
+                <a16:creationId xmlns:a16="http://schemas.microsoft.com/office/drawing/2014/main" id="{0D6C0BA6-711E-456A-AD4A-69EB97B94C9B}"/>
               </a:ext>
             </a:extLst>
           </p:cNvPr>
@@ -2121,7 +2121,7 @@
           <p:cNvPr id="4" name="Espaço Reservado para Número de Slide 3">
             <a:extLst>
               <a:ext uri="{FF2B5EF4-FFF2-40B4-BE49-F238E27FC236}">
-                <a16:creationId xmlns:a16="http://schemas.microsoft.com/office/drawing/2014/main" xmlns="" id="{C2127EC6-DA74-49FD-88F9-E10F0FCAD865}"/>
+                <a16:creationId xmlns:a16="http://schemas.microsoft.com/office/drawing/2014/main" id="{C2127EC6-DA74-49FD-88F9-E10F0FCAD865}"/>
               </a:ext>
             </a:extLst>
           </p:cNvPr>
@@ -2180,7 +2180,7 @@
           <p:cNvPr id="2" name="Título 1">
             <a:extLst>
               <a:ext uri="{FF2B5EF4-FFF2-40B4-BE49-F238E27FC236}">
-                <a16:creationId xmlns:a16="http://schemas.microsoft.com/office/drawing/2014/main" xmlns="" id="{48AFB8F7-A375-4BC7-9958-B5CB035284E8}"/>
+                <a16:creationId xmlns:a16="http://schemas.microsoft.com/office/drawing/2014/main" id="{48AFB8F7-A375-4BC7-9958-B5CB035284E8}"/>
               </a:ext>
             </a:extLst>
           </p:cNvPr>
@@ -2217,7 +2217,7 @@
           <p:cNvPr id="3" name="Espaço Reservado para Conteúdo 2">
             <a:extLst>
               <a:ext uri="{FF2B5EF4-FFF2-40B4-BE49-F238E27FC236}">
-                <a16:creationId xmlns:a16="http://schemas.microsoft.com/office/drawing/2014/main" xmlns="" id="{67354188-5696-4955-8496-5A30602AE6BD}"/>
+                <a16:creationId xmlns:a16="http://schemas.microsoft.com/office/drawing/2014/main" id="{67354188-5696-4955-8496-5A30602AE6BD}"/>
               </a:ext>
             </a:extLst>
           </p:cNvPr>
@@ -2307,7 +2307,7 @@
           <p:cNvPr id="4" name="Espaço Reservado para Texto 3">
             <a:extLst>
               <a:ext uri="{FF2B5EF4-FFF2-40B4-BE49-F238E27FC236}">
-                <a16:creationId xmlns:a16="http://schemas.microsoft.com/office/drawing/2014/main" xmlns="" id="{2DB4C8F1-3EA8-4412-8269-67E1724F460A}"/>
+                <a16:creationId xmlns:a16="http://schemas.microsoft.com/office/drawing/2014/main" id="{2DB4C8F1-3EA8-4412-8269-67E1724F460A}"/>
               </a:ext>
             </a:extLst>
           </p:cNvPr>
@@ -2378,7 +2378,7 @@
           <p:cNvPr id="5" name="Espaço Reservado para Data 4">
             <a:extLst>
               <a:ext uri="{FF2B5EF4-FFF2-40B4-BE49-F238E27FC236}">
-                <a16:creationId xmlns:a16="http://schemas.microsoft.com/office/drawing/2014/main" xmlns="" id="{F964C919-43A3-4E4A-A029-D09BDD2CED1C}"/>
+                <a16:creationId xmlns:a16="http://schemas.microsoft.com/office/drawing/2014/main" id="{F964C919-43A3-4E4A-A029-D09BDD2CED1C}"/>
               </a:ext>
             </a:extLst>
           </p:cNvPr>
@@ -2396,7 +2396,7 @@
           <a:p>
             <a:fld id="{87AC05A1-1DFA-4BA5-BCC4-076DF4D4C95B}" type="datetimeFigureOut">
               <a:rPr lang="pt-BR" smtClean="0"/>
-              <a:t>13/11/2017</a:t>
+              <a:t>14/11/2017</a:t>
             </a:fld>
             <a:endParaRPr lang="pt-BR"/>
           </a:p>
@@ -2407,7 +2407,7 @@
           <p:cNvPr id="6" name="Espaço Reservado para Rodapé 5">
             <a:extLst>
               <a:ext uri="{FF2B5EF4-FFF2-40B4-BE49-F238E27FC236}">
-                <a16:creationId xmlns:a16="http://schemas.microsoft.com/office/drawing/2014/main" xmlns="" id="{95DB921E-923C-4508-BD77-182FE1CA083E}"/>
+                <a16:creationId xmlns:a16="http://schemas.microsoft.com/office/drawing/2014/main" id="{95DB921E-923C-4508-BD77-182FE1CA083E}"/>
               </a:ext>
             </a:extLst>
           </p:cNvPr>
@@ -2432,7 +2432,7 @@
           <p:cNvPr id="7" name="Espaço Reservado para Número de Slide 6">
             <a:extLst>
               <a:ext uri="{FF2B5EF4-FFF2-40B4-BE49-F238E27FC236}">
-                <a16:creationId xmlns:a16="http://schemas.microsoft.com/office/drawing/2014/main" xmlns="" id="{4219E267-1049-4A7C-9E73-C9D706922276}"/>
+                <a16:creationId xmlns:a16="http://schemas.microsoft.com/office/drawing/2014/main" id="{4219E267-1049-4A7C-9E73-C9D706922276}"/>
               </a:ext>
             </a:extLst>
           </p:cNvPr>
@@ -2491,7 +2491,7 @@
           <p:cNvPr id="2" name="Título 1">
             <a:extLst>
               <a:ext uri="{FF2B5EF4-FFF2-40B4-BE49-F238E27FC236}">
-                <a16:creationId xmlns:a16="http://schemas.microsoft.com/office/drawing/2014/main" xmlns="" id="{11B65389-1EC5-4C35-AB88-1B837744591B}"/>
+                <a16:creationId xmlns:a16="http://schemas.microsoft.com/office/drawing/2014/main" id="{11B65389-1EC5-4C35-AB88-1B837744591B}"/>
               </a:ext>
             </a:extLst>
           </p:cNvPr>
@@ -2528,7 +2528,7 @@
           <p:cNvPr id="3" name="Espaço Reservado para Imagem 2">
             <a:extLst>
               <a:ext uri="{FF2B5EF4-FFF2-40B4-BE49-F238E27FC236}">
-                <a16:creationId xmlns:a16="http://schemas.microsoft.com/office/drawing/2014/main" xmlns="" id="{BB850947-7893-427E-B4D7-AD58A423754A}"/>
+                <a16:creationId xmlns:a16="http://schemas.microsoft.com/office/drawing/2014/main" id="{BB850947-7893-427E-B4D7-AD58A423754A}"/>
               </a:ext>
             </a:extLst>
           </p:cNvPr>
@@ -2595,7 +2595,7 @@
           <p:cNvPr id="4" name="Espaço Reservado para Texto 3">
             <a:extLst>
               <a:ext uri="{FF2B5EF4-FFF2-40B4-BE49-F238E27FC236}">
-                <a16:creationId xmlns:a16="http://schemas.microsoft.com/office/drawing/2014/main" xmlns="" id="{EF5433DF-4CA1-4942-B04F-D7288F18491C}"/>
+                <a16:creationId xmlns:a16="http://schemas.microsoft.com/office/drawing/2014/main" id="{EF5433DF-4CA1-4942-B04F-D7288F18491C}"/>
               </a:ext>
             </a:extLst>
           </p:cNvPr>
@@ -2666,7 +2666,7 @@
           <p:cNvPr id="5" name="Espaço Reservado para Data 4">
             <a:extLst>
               <a:ext uri="{FF2B5EF4-FFF2-40B4-BE49-F238E27FC236}">
-                <a16:creationId xmlns:a16="http://schemas.microsoft.com/office/drawing/2014/main" xmlns="" id="{CCECB230-9273-4050-ADD9-A061A2407BE8}"/>
+                <a16:creationId xmlns:a16="http://schemas.microsoft.com/office/drawing/2014/main" id="{CCECB230-9273-4050-ADD9-A061A2407BE8}"/>
               </a:ext>
             </a:extLst>
           </p:cNvPr>
@@ -2684,7 +2684,7 @@
           <a:p>
             <a:fld id="{87AC05A1-1DFA-4BA5-BCC4-076DF4D4C95B}" type="datetimeFigureOut">
               <a:rPr lang="pt-BR" smtClean="0"/>
-              <a:t>13/11/2017</a:t>
+              <a:t>14/11/2017</a:t>
             </a:fld>
             <a:endParaRPr lang="pt-BR"/>
           </a:p>
@@ -2695,7 +2695,7 @@
           <p:cNvPr id="6" name="Espaço Reservado para Rodapé 5">
             <a:extLst>
               <a:ext uri="{FF2B5EF4-FFF2-40B4-BE49-F238E27FC236}">
-                <a16:creationId xmlns:a16="http://schemas.microsoft.com/office/drawing/2014/main" xmlns="" id="{B93B0485-CAD0-463D-AE19-4DD5841C8989}"/>
+                <a16:creationId xmlns:a16="http://schemas.microsoft.com/office/drawing/2014/main" id="{B93B0485-CAD0-463D-AE19-4DD5841C8989}"/>
               </a:ext>
             </a:extLst>
           </p:cNvPr>
@@ -2720,7 +2720,7 @@
           <p:cNvPr id="7" name="Espaço Reservado para Número de Slide 6">
             <a:extLst>
               <a:ext uri="{FF2B5EF4-FFF2-40B4-BE49-F238E27FC236}">
-                <a16:creationId xmlns:a16="http://schemas.microsoft.com/office/drawing/2014/main" xmlns="" id="{6F3DC2F0-F6B6-4EE4-AA0F-51C7BB118449}"/>
+                <a16:creationId xmlns:a16="http://schemas.microsoft.com/office/drawing/2014/main" id="{6F3DC2F0-F6B6-4EE4-AA0F-51C7BB118449}"/>
               </a:ext>
             </a:extLst>
           </p:cNvPr>
@@ -2784,7 +2784,7 @@
           <p:cNvPr id="2" name="Espaço Reservado para Título 1">
             <a:extLst>
               <a:ext uri="{FF2B5EF4-FFF2-40B4-BE49-F238E27FC236}">
-                <a16:creationId xmlns:a16="http://schemas.microsoft.com/office/drawing/2014/main" xmlns="" id="{7D3D2626-91B7-4FA5-A17C-899A21646E2C}"/>
+                <a16:creationId xmlns:a16="http://schemas.microsoft.com/office/drawing/2014/main" id="{7D3D2626-91B7-4FA5-A17C-899A21646E2C}"/>
               </a:ext>
             </a:extLst>
           </p:cNvPr>
@@ -2822,7 +2822,7 @@
           <p:cNvPr id="3" name="Espaço Reservado para Texto 2">
             <a:extLst>
               <a:ext uri="{FF2B5EF4-FFF2-40B4-BE49-F238E27FC236}">
-                <a16:creationId xmlns:a16="http://schemas.microsoft.com/office/drawing/2014/main" xmlns="" id="{996ACB37-1643-4895-9343-9CACAAB025D1}"/>
+                <a16:creationId xmlns:a16="http://schemas.microsoft.com/office/drawing/2014/main" id="{996ACB37-1643-4895-9343-9CACAAB025D1}"/>
               </a:ext>
             </a:extLst>
           </p:cNvPr>
@@ -2889,7 +2889,7 @@
           <p:cNvPr id="4" name="Espaço Reservado para Data 3">
             <a:extLst>
               <a:ext uri="{FF2B5EF4-FFF2-40B4-BE49-F238E27FC236}">
-                <a16:creationId xmlns:a16="http://schemas.microsoft.com/office/drawing/2014/main" xmlns="" id="{81584287-2D79-46CE-9EEF-26753DA019FC}"/>
+                <a16:creationId xmlns:a16="http://schemas.microsoft.com/office/drawing/2014/main" id="{81584287-2D79-46CE-9EEF-26753DA019FC}"/>
               </a:ext>
             </a:extLst>
           </p:cNvPr>
@@ -2925,7 +2925,7 @@
           <a:p>
             <a:fld id="{87AC05A1-1DFA-4BA5-BCC4-076DF4D4C95B}" type="datetimeFigureOut">
               <a:rPr lang="pt-BR" smtClean="0"/>
-              <a:t>13/11/2017</a:t>
+              <a:t>14/11/2017</a:t>
             </a:fld>
             <a:endParaRPr lang="pt-BR"/>
           </a:p>
@@ -2936,7 +2936,7 @@
           <p:cNvPr id="5" name="Espaço Reservado para Rodapé 4">
             <a:extLst>
               <a:ext uri="{FF2B5EF4-FFF2-40B4-BE49-F238E27FC236}">
-                <a16:creationId xmlns:a16="http://schemas.microsoft.com/office/drawing/2014/main" xmlns="" id="{EF32D200-E38B-437C-B69E-7293442E9E24}"/>
+                <a16:creationId xmlns:a16="http://schemas.microsoft.com/office/drawing/2014/main" id="{EF32D200-E38B-437C-B69E-7293442E9E24}"/>
               </a:ext>
             </a:extLst>
           </p:cNvPr>
@@ -2979,7 +2979,7 @@
           <p:cNvPr id="6" name="Espaço Reservado para Número de Slide 5">
             <a:extLst>
               <a:ext uri="{FF2B5EF4-FFF2-40B4-BE49-F238E27FC236}">
-                <a16:creationId xmlns:a16="http://schemas.microsoft.com/office/drawing/2014/main" xmlns="" id="{627289A9-F9F4-4F81-AE04-D686D7644D13}"/>
+                <a16:creationId xmlns:a16="http://schemas.microsoft.com/office/drawing/2014/main" id="{627289A9-F9F4-4F81-AE04-D686D7644D13}"/>
               </a:ext>
             </a:extLst>
           </p:cNvPr>
@@ -3347,7 +3347,7 @@
           <p:cNvPr id="2" name="Título 1">
             <a:extLst>
               <a:ext uri="{FF2B5EF4-FFF2-40B4-BE49-F238E27FC236}">
-                <a16:creationId xmlns:a16="http://schemas.microsoft.com/office/drawing/2014/main" xmlns="" id="{53EEE7EF-30DE-4D48-A0C6-397EFA854F68}"/>
+                <a16:creationId xmlns:a16="http://schemas.microsoft.com/office/drawing/2014/main" id="{53EEE7EF-30DE-4D48-A0C6-397EFA854F68}"/>
               </a:ext>
             </a:extLst>
           </p:cNvPr>
@@ -3379,15 +3379,7 @@
             </a:br>
             <a:r>
               <a:rPr lang="pt-BR" dirty="0"/>
-              <a:t>Implementação de </a:t>
-            </a:r>
-            <a:r>
-              <a:rPr lang="pt-BR" dirty="0" smtClean="0"/>
-              <a:t>Simulador </a:t>
-            </a:r>
-            <a:r>
-              <a:rPr lang="pt-BR" dirty="0"/>
-              <a:t>de Lançamento Oblíquo</a:t>
+              <a:t>Implementação de Simulador de Lançamento Oblíquo</a:t>
             </a:r>
           </a:p>
         </p:txBody>
@@ -3397,7 +3389,7 @@
           <p:cNvPr id="3" name="Subtítulo 2">
             <a:extLst>
               <a:ext uri="{FF2B5EF4-FFF2-40B4-BE49-F238E27FC236}">
-                <a16:creationId xmlns:a16="http://schemas.microsoft.com/office/drawing/2014/main" xmlns="" id="{746F8482-5778-4E79-BF04-C3CE71CB9359}"/>
+                <a16:creationId xmlns:a16="http://schemas.microsoft.com/office/drawing/2014/main" id="{746F8482-5778-4E79-BF04-C3CE71CB9359}"/>
               </a:ext>
             </a:extLst>
           </p:cNvPr>
@@ -3427,7 +3419,7 @@
           <p:cNvPr id="5" name="Imagem 4">
             <a:extLst>
               <a:ext uri="{FF2B5EF4-FFF2-40B4-BE49-F238E27FC236}">
-                <a16:creationId xmlns:a16="http://schemas.microsoft.com/office/drawing/2014/main" xmlns="" id="{A82C4944-2AE9-49E4-9823-EDF972D548DF}"/>
+                <a16:creationId xmlns:a16="http://schemas.microsoft.com/office/drawing/2014/main" id="{A82C4944-2AE9-49E4-9823-EDF972D548DF}"/>
               </a:ext>
             </a:extLst>
           </p:cNvPr>
@@ -3493,7 +3485,7 @@
           <p:cNvPr id="2" name="Título 1">
             <a:extLst>
               <a:ext uri="{FF2B5EF4-FFF2-40B4-BE49-F238E27FC236}">
-                <a16:creationId xmlns:a16="http://schemas.microsoft.com/office/drawing/2014/main" xmlns="" id="{8CC43F10-156A-4375-A25E-590C555C751B}"/>
+                <a16:creationId xmlns:a16="http://schemas.microsoft.com/office/drawing/2014/main" id="{8CC43F10-156A-4375-A25E-590C555C751B}"/>
               </a:ext>
             </a:extLst>
           </p:cNvPr>
@@ -3521,7 +3513,7 @@
           <p:cNvPr id="3" name="Espaço Reservado para Conteúdo 2">
             <a:extLst>
               <a:ext uri="{FF2B5EF4-FFF2-40B4-BE49-F238E27FC236}">
-                <a16:creationId xmlns:a16="http://schemas.microsoft.com/office/drawing/2014/main" xmlns="" id="{3A3EC19A-56FC-4EF9-BFBF-7A2776C422BA}"/>
+                <a16:creationId xmlns:a16="http://schemas.microsoft.com/office/drawing/2014/main" id="{3A3EC19A-56FC-4EF9-BFBF-7A2776C422BA}"/>
               </a:ext>
             </a:extLst>
           </p:cNvPr>
@@ -3539,38 +3531,17 @@
           <a:p>
             <a:r>
               <a:rPr lang="pt-BR" dirty="0"/>
-              <a:t>Definido os valores iniciais, </a:t>
-            </a:r>
-            <a:r>
-              <a:rPr lang="pt-BR" dirty="0" smtClean="0"/>
-              <a:t>é iniciado o cálculo da parábola clicando no botão ‘’GO’’, assim, podendo visualizar o desenvolvimento </a:t>
-            </a:r>
-            <a:r>
-              <a:rPr lang="pt-BR" dirty="0"/>
-              <a:t>do </a:t>
-            </a:r>
-            <a:r>
-              <a:rPr lang="pt-BR" dirty="0" smtClean="0"/>
-              <a:t>gráfico</a:t>
-            </a:r>
-            <a:r>
-              <a:rPr lang="pt-BR" dirty="0"/>
-              <a:t>, conforme </a:t>
-            </a:r>
-            <a:r>
-              <a:rPr lang="pt-BR" dirty="0" smtClean="0"/>
-              <a:t>apresentado nas figuras a seguir :</a:t>
-            </a:r>
-            <a:endParaRPr lang="pt-BR" dirty="0"/>
+              <a:t>Definido os valores iniciais, iniciamos o cálculo da parábola clicando no botão ‘’GO’’, assim, podendo visualizar o desenvolvimento do gráfico, conforme apresentado nas figuras a seguir :</a:t>
+            </a:r>
           </a:p>
         </p:txBody>
       </p:sp>
       <p:pic>
         <p:nvPicPr>
-          <p:cNvPr id="8" name="Imagem 7">
-            <a:extLst>
-              <a:ext uri="{FF2B5EF4-FFF2-40B4-BE49-F238E27FC236}">
-                <a16:creationId xmlns:a16="http://schemas.microsoft.com/office/drawing/2014/main" xmlns="" id="{72E2981D-1BA3-4BFF-90F6-DD8E921E41FC}"/>
+          <p:cNvPr id="5" name="Imagem 4">
+            <a:extLst>
+              <a:ext uri="{FF2B5EF4-FFF2-40B4-BE49-F238E27FC236}">
+                <a16:creationId xmlns:a16="http://schemas.microsoft.com/office/drawing/2014/main" id="{A92AD2E1-0C23-4A28-A55B-A966D852E5D5}"/>
               </a:ext>
             </a:extLst>
           </p:cNvPr>
@@ -3593,44 +3564,8 @@
         </p:blipFill>
         <p:spPr>
           <a:xfrm>
-            <a:off x="838200" y="3424400"/>
-            <a:ext cx="5315692" cy="2676899"/>
-          </a:xfrm>
-          <a:prstGeom prst="rect">
-            <a:avLst/>
-          </a:prstGeom>
-        </p:spPr>
-      </p:pic>
-      <p:pic>
-        <p:nvPicPr>
-          <p:cNvPr id="10" name="Imagem 9">
-            <a:extLst>
-              <a:ext uri="{FF2B5EF4-FFF2-40B4-BE49-F238E27FC236}">
-                <a16:creationId xmlns:a16="http://schemas.microsoft.com/office/drawing/2014/main" xmlns="" id="{74266D04-CEAB-4BB9-91E7-5373E89F694E}"/>
-              </a:ext>
-            </a:extLst>
-          </p:cNvPr>
-          <p:cNvPicPr>
-            <a:picLocks noChangeAspect="1"/>
-          </p:cNvPicPr>
-          <p:nvPr/>
-        </p:nvPicPr>
-        <p:blipFill>
-          <a:blip r:embed="rId3">
-            <a:extLst>
-              <a:ext uri="{28A0092B-C50C-407E-A947-70E740481C1C}">
-                <a14:useLocalDpi xmlns:a14="http://schemas.microsoft.com/office/drawing/2010/main" val="0"/>
-              </a:ext>
-            </a:extLst>
-          </a:blip>
-          <a:stretch>
-            <a:fillRect/>
-          </a:stretch>
-        </p:blipFill>
-        <p:spPr>
-          <a:xfrm>
-            <a:off x="6153892" y="3422867"/>
-            <a:ext cx="5515745" cy="2800741"/>
+            <a:off x="766018" y="3461959"/>
+            <a:ext cx="10659963" cy="2715004"/>
           </a:xfrm>
           <a:prstGeom prst="rect">
             <a:avLst/>
@@ -3672,7 +3607,7 @@
           <p:cNvPr id="2" name="Título 1">
             <a:extLst>
               <a:ext uri="{FF2B5EF4-FFF2-40B4-BE49-F238E27FC236}">
-                <a16:creationId xmlns:a16="http://schemas.microsoft.com/office/drawing/2014/main" xmlns="" id="{8CC43F10-156A-4375-A25E-590C555C751B}"/>
+                <a16:creationId xmlns:a16="http://schemas.microsoft.com/office/drawing/2014/main" id="{8CC43F10-156A-4375-A25E-590C555C751B}"/>
               </a:ext>
             </a:extLst>
           </p:cNvPr>
@@ -3700,7 +3635,7 @@
           <p:cNvPr id="3" name="Espaço Reservado para Conteúdo 2">
             <a:extLst>
               <a:ext uri="{FF2B5EF4-FFF2-40B4-BE49-F238E27FC236}">
-                <a16:creationId xmlns:a16="http://schemas.microsoft.com/office/drawing/2014/main" xmlns="" id="{3A3EC19A-56FC-4EF9-BFBF-7A2776C422BA}"/>
+                <a16:creationId xmlns:a16="http://schemas.microsoft.com/office/drawing/2014/main" id="{3A3EC19A-56FC-4EF9-BFBF-7A2776C422BA}"/>
               </a:ext>
             </a:extLst>
           </p:cNvPr>
@@ -3714,7 +3649,7 @@
         <p:spPr>
           <a:xfrm>
             <a:off x="838200" y="1825625"/>
-            <a:ext cx="3058391" cy="4351338"/>
+            <a:ext cx="3582971" cy="4351338"/>
           </a:xfrm>
         </p:spPr>
         <p:txBody>
@@ -3723,46 +3658,17 @@
           <a:p>
             <a:r>
               <a:rPr lang="pt-BR" dirty="0"/>
-              <a:t>Ao </a:t>
-            </a:r>
-            <a:r>
-              <a:rPr lang="pt-BR" dirty="0" smtClean="0"/>
-              <a:t>término </a:t>
-            </a:r>
-            <a:r>
-              <a:rPr lang="pt-BR" dirty="0"/>
-              <a:t>do </a:t>
-            </a:r>
-            <a:r>
-              <a:rPr lang="pt-BR" dirty="0" smtClean="0"/>
-              <a:t>cálculo</a:t>
-            </a:r>
-            <a:r>
-              <a:rPr lang="pt-BR" dirty="0"/>
-              <a:t>, </a:t>
-            </a:r>
-            <a:r>
-              <a:rPr lang="pt-BR" dirty="0" smtClean="0"/>
-              <a:t>é obtido a Distância </a:t>
-            </a:r>
-            <a:r>
-              <a:rPr lang="pt-BR" dirty="0"/>
-              <a:t>atingida, Altura alcançada e Tempo </a:t>
-            </a:r>
-            <a:r>
-              <a:rPr lang="pt-BR" dirty="0" smtClean="0"/>
-              <a:t>ocorrido</a:t>
-            </a:r>
-            <a:endParaRPr lang="pt-BR" dirty="0"/>
+              <a:t>Ao término da simulação, obtemos a Distância atingida, Altura alcançada e Tempo ocorrido</a:t>
+            </a:r>
           </a:p>
         </p:txBody>
       </p:sp>
       <p:pic>
         <p:nvPicPr>
-          <p:cNvPr id="6" name="Imagem 5">
-            <a:extLst>
-              <a:ext uri="{FF2B5EF4-FFF2-40B4-BE49-F238E27FC236}">
-                <a16:creationId xmlns:a16="http://schemas.microsoft.com/office/drawing/2014/main" xmlns="" id="{1CA3DB59-7BEE-4EF8-B4F3-FCC00B4F78CD}"/>
+          <p:cNvPr id="5" name="Imagem 4">
+            <a:extLst>
+              <a:ext uri="{FF2B5EF4-FFF2-40B4-BE49-F238E27FC236}">
+                <a16:creationId xmlns:a16="http://schemas.microsoft.com/office/drawing/2014/main" id="{EA5C214E-924A-4CA0-9280-EE6FC5D89308}"/>
               </a:ext>
             </a:extLst>
           </p:cNvPr>
@@ -3785,8 +3691,8 @@
         </p:blipFill>
         <p:spPr>
           <a:xfrm>
-            <a:off x="3896591" y="1753299"/>
-            <a:ext cx="7266980" cy="4315320"/>
+            <a:off x="4279717" y="1690688"/>
+            <a:ext cx="7570999" cy="4443564"/>
           </a:xfrm>
           <a:prstGeom prst="rect">
             <a:avLst/>
@@ -3839,10 +3745,9 @@
           <a:lstStyle/>
           <a:p>
             <a:r>
-              <a:rPr lang="pt-BR" dirty="0" smtClean="0"/>
+              <a:rPr lang="pt-BR" dirty="0"/>
               <a:t>Aplicação	</a:t>
             </a:r>
-            <a:endParaRPr lang="pt-BR" dirty="0"/>
           </a:p>
         </p:txBody>
       </p:sp>
@@ -3862,7 +3767,7 @@
           <a:lstStyle/>
           <a:p>
             <a:r>
-              <a:rPr lang="pt-BR" dirty="0" smtClean="0"/>
+              <a:rPr lang="pt-BR" dirty="0"/>
               <a:t>A tabela a seguir, apresenta resultados de variáveis finais em determinados contextos de variáveis de entradas.</a:t>
             </a:r>
           </a:p>
@@ -3880,7 +3785,7 @@
           <p:nvPr>
             <p:extLst>
               <p:ext uri="{D42A27DB-BD31-4B8C-83A1-F6EECF244321}">
-                <p14:modId xmlns:p14="http://schemas.microsoft.com/office/powerpoint/2010/main" val="836831379"/>
+                <p14:modId xmlns:p14="http://schemas.microsoft.com/office/powerpoint/2010/main" val="4164326890"/>
               </p:ext>
             </p:extLst>
           </p:nvPr>
@@ -3896,14 +3801,62 @@
                 <a:tableStyleId>{5C22544A-7EE6-4342-B048-85BDC9FD1C3A}</a:tableStyleId>
               </a:tblPr>
               <a:tblGrid>
-                <a:gridCol w="1226125"/>
-                <a:gridCol w="1017733"/>
-                <a:gridCol w="1098980"/>
-                <a:gridCol w="1229160"/>
-                <a:gridCol w="1174172"/>
-                <a:gridCol w="985405"/>
-                <a:gridCol w="1227859"/>
-                <a:gridCol w="1015999"/>
+                <a:gridCol w="1226125">
+                  <a:extLst>
+                    <a:ext uri="{9D8B030D-6E8A-4147-A177-3AD203B41FA5}">
+                      <a16:colId xmlns:a16="http://schemas.microsoft.com/office/drawing/2014/main" val="20000"/>
+                    </a:ext>
+                  </a:extLst>
+                </a:gridCol>
+                <a:gridCol w="1017733">
+                  <a:extLst>
+                    <a:ext uri="{9D8B030D-6E8A-4147-A177-3AD203B41FA5}">
+                      <a16:colId xmlns:a16="http://schemas.microsoft.com/office/drawing/2014/main" val="20001"/>
+                    </a:ext>
+                  </a:extLst>
+                </a:gridCol>
+                <a:gridCol w="1098980">
+                  <a:extLst>
+                    <a:ext uri="{9D8B030D-6E8A-4147-A177-3AD203B41FA5}">
+                      <a16:colId xmlns:a16="http://schemas.microsoft.com/office/drawing/2014/main" val="20002"/>
+                    </a:ext>
+                  </a:extLst>
+                </a:gridCol>
+                <a:gridCol w="1229160">
+                  <a:extLst>
+                    <a:ext uri="{9D8B030D-6E8A-4147-A177-3AD203B41FA5}">
+                      <a16:colId xmlns:a16="http://schemas.microsoft.com/office/drawing/2014/main" val="20003"/>
+                    </a:ext>
+                  </a:extLst>
+                </a:gridCol>
+                <a:gridCol w="1174172">
+                  <a:extLst>
+                    <a:ext uri="{9D8B030D-6E8A-4147-A177-3AD203B41FA5}">
+                      <a16:colId xmlns:a16="http://schemas.microsoft.com/office/drawing/2014/main" val="20004"/>
+                    </a:ext>
+                  </a:extLst>
+                </a:gridCol>
+                <a:gridCol w="985405">
+                  <a:extLst>
+                    <a:ext uri="{9D8B030D-6E8A-4147-A177-3AD203B41FA5}">
+                      <a16:colId xmlns:a16="http://schemas.microsoft.com/office/drawing/2014/main" val="20005"/>
+                    </a:ext>
+                  </a:extLst>
+                </a:gridCol>
+                <a:gridCol w="1227859">
+                  <a:extLst>
+                    <a:ext uri="{9D8B030D-6E8A-4147-A177-3AD203B41FA5}">
+                      <a16:colId xmlns:a16="http://schemas.microsoft.com/office/drawing/2014/main" val="20006"/>
+                    </a:ext>
+                  </a:extLst>
+                </a:gridCol>
+                <a:gridCol w="1015999">
+                  <a:extLst>
+                    <a:ext uri="{9D8B030D-6E8A-4147-A177-3AD203B41FA5}">
+                      <a16:colId xmlns:a16="http://schemas.microsoft.com/office/drawing/2014/main" val="20007"/>
+                    </a:ext>
+                  </a:extLst>
+                </a:gridCol>
               </a:tblGrid>
               <a:tr h="497939">
                 <a:tc>
@@ -3913,7 +3866,7 @@
                     <a:p>
                       <a:pPr algn="ctr"/>
                       <a:r>
-                        <a:rPr lang="pt-BR" dirty="0" smtClean="0">
+                        <a:rPr lang="pt-BR" dirty="0">
                           <a:solidFill>
                             <a:schemeClr val="tx1"/>
                           </a:solidFill>
@@ -3921,7 +3874,7 @@
                         <a:t>Variáveis</a:t>
                       </a:r>
                       <a:r>
-                        <a:rPr lang="pt-BR" baseline="0" dirty="0" smtClean="0">
+                        <a:rPr lang="pt-BR" baseline="0" dirty="0">
                           <a:solidFill>
                             <a:schemeClr val="tx1"/>
                           </a:solidFill>
@@ -3944,18 +3897,13 @@
                     <a:p>
                       <a:pPr algn="ctr"/>
                       <a:r>
-                        <a:rPr lang="pt-BR" dirty="0" smtClean="0">
+                        <a:rPr lang="pt-BR" dirty="0">
                           <a:solidFill>
                             <a:schemeClr val="accent4"/>
                           </a:solidFill>
                         </a:rPr>
                         <a:t>Altura Inicial</a:t>
                       </a:r>
-                      <a:endParaRPr lang="pt-BR" dirty="0">
-                        <a:solidFill>
-                          <a:schemeClr val="accent4"/>
-                        </a:solidFill>
-                      </a:endParaRPr>
                     </a:p>
                   </a:txBody>
                   <a:tcPr/>
@@ -3967,18 +3915,13 @@
                     <a:p>
                       <a:pPr algn="ctr"/>
                       <a:r>
-                        <a:rPr lang="pt-BR" dirty="0" smtClean="0">
+                        <a:rPr lang="pt-BR" dirty="0">
                           <a:solidFill>
                             <a:schemeClr val="accent4"/>
                           </a:solidFill>
                         </a:rPr>
                         <a:t>Ângulo</a:t>
                       </a:r>
-                      <a:endParaRPr lang="pt-BR" dirty="0">
-                        <a:solidFill>
-                          <a:schemeClr val="accent4"/>
-                        </a:solidFill>
-                      </a:endParaRPr>
                     </a:p>
                   </a:txBody>
                   <a:tcPr/>
@@ -3990,18 +3933,13 @@
                     <a:p>
                       <a:pPr algn="ctr"/>
                       <a:r>
-                        <a:rPr lang="pt-BR" dirty="0" smtClean="0">
+                        <a:rPr lang="pt-BR" dirty="0">
                           <a:solidFill>
                             <a:schemeClr val="accent4"/>
                           </a:solidFill>
                         </a:rPr>
                         <a:t>Velocidade Inicial</a:t>
                       </a:r>
-                      <a:endParaRPr lang="pt-BR" dirty="0">
-                        <a:solidFill>
-                          <a:schemeClr val="accent4"/>
-                        </a:solidFill>
-                      </a:endParaRPr>
                     </a:p>
                   </a:txBody>
                   <a:tcPr/>
@@ -4013,18 +3951,13 @@
                     <a:p>
                       <a:pPr algn="ctr"/>
                       <a:r>
-                        <a:rPr lang="pt-BR" dirty="0" smtClean="0">
+                        <a:rPr lang="pt-BR" dirty="0">
                           <a:solidFill>
                             <a:schemeClr val="accent4"/>
                           </a:solidFill>
                         </a:rPr>
                         <a:t>Gravidade</a:t>
                       </a:r>
-                      <a:endParaRPr lang="pt-BR" dirty="0">
-                        <a:solidFill>
-                          <a:schemeClr val="accent4"/>
-                        </a:solidFill>
-                      </a:endParaRPr>
                     </a:p>
                   </a:txBody>
                   <a:tcPr/>
@@ -4036,18 +3969,13 @@
                     <a:p>
                       <a:pPr algn="ctr"/>
                       <a:r>
-                        <a:rPr lang="pt-BR" dirty="0" smtClean="0">
+                        <a:rPr lang="pt-BR" dirty="0">
                           <a:solidFill>
                             <a:srgbClr val="FF0000"/>
                           </a:solidFill>
                         </a:rPr>
                         <a:t>Altura Máxima</a:t>
                       </a:r>
-                      <a:endParaRPr lang="pt-BR" dirty="0">
-                        <a:solidFill>
-                          <a:srgbClr val="FF0000"/>
-                        </a:solidFill>
-                      </a:endParaRPr>
                     </a:p>
                   </a:txBody>
                   <a:tcPr/>
@@ -4059,18 +3987,13 @@
                     <a:p>
                       <a:pPr algn="ctr"/>
                       <a:r>
-                        <a:rPr lang="pt-BR" dirty="0" smtClean="0">
+                        <a:rPr lang="pt-BR" dirty="0">
                           <a:solidFill>
                             <a:srgbClr val="FF0000"/>
                           </a:solidFill>
                         </a:rPr>
                         <a:t>Distância</a:t>
                       </a:r>
-                      <a:endParaRPr lang="pt-BR" dirty="0">
-                        <a:solidFill>
-                          <a:srgbClr val="FF0000"/>
-                        </a:solidFill>
-                      </a:endParaRPr>
                     </a:p>
                   </a:txBody>
                   <a:tcPr/>
@@ -4082,22 +4005,22 @@
                     <a:p>
                       <a:pPr algn="ctr"/>
                       <a:r>
-                        <a:rPr lang="pt-BR" dirty="0" smtClean="0">
+                        <a:rPr lang="pt-BR" dirty="0">
                           <a:solidFill>
                             <a:srgbClr val="FF0000"/>
                           </a:solidFill>
                         </a:rPr>
                         <a:t>Tempo</a:t>
                       </a:r>
-                      <a:endParaRPr lang="pt-BR" dirty="0">
-                        <a:solidFill>
-                          <a:srgbClr val="FF0000"/>
-                        </a:solidFill>
-                      </a:endParaRPr>
                     </a:p>
                   </a:txBody>
                   <a:tcPr/>
                 </a:tc>
+                <a:extLst>
+                  <a:ext uri="{0D108BD9-81ED-4DB2-BD59-A6C34878D82A}">
+                    <a16:rowId xmlns:a16="http://schemas.microsoft.com/office/drawing/2014/main" val="10000"/>
+                  </a:ext>
+                </a:extLst>
               </a:tr>
               <a:tr h="497939">
                 <a:tc>
@@ -4107,20 +4030,9 @@
                     <a:p>
                       <a:pPr algn="ctr"/>
                       <a:r>
-                        <a:rPr lang="pt-BR" dirty="0" smtClean="0"/>
+                        <a:rPr lang="pt-BR" dirty="0"/>
                         <a:t>*</a:t>
                       </a:r>
-                      <a:endParaRPr lang="pt-BR" dirty="0"/>
-                    </a:p>
-                  </a:txBody>
-                  <a:tcPr/>
-                </a:tc>
-                <a:tc>
-                  <a:txBody>
-                    <a:bodyPr/>
-                    <a:lstStyle/>
-                    <a:p>
-                      <a:endParaRPr lang="pt-BR" dirty="0"/>
                     </a:p>
                   </a:txBody>
                   <a:tcPr/>
@@ -4131,99 +4043,9 @@
                     <a:lstStyle/>
                     <a:p>
                       <a:r>
-                        <a:rPr lang="pt-BR" dirty="0" smtClean="0"/>
-                        <a:t>15°</a:t>
+                        <a:rPr lang="pt-BR" dirty="0"/>
+                        <a:t>0</a:t>
                       </a:r>
-                      <a:endParaRPr lang="pt-BR" dirty="0"/>
-                    </a:p>
-                  </a:txBody>
-                  <a:tcPr/>
-                </a:tc>
-                <a:tc>
-                  <a:txBody>
-                    <a:bodyPr/>
-                    <a:lstStyle/>
-                    <a:p>
-                      <a:endParaRPr lang="pt-BR" dirty="0"/>
-                    </a:p>
-                  </a:txBody>
-                  <a:tcPr/>
-                </a:tc>
-                <a:tc>
-                  <a:txBody>
-                    <a:bodyPr/>
-                    <a:lstStyle/>
-                    <a:p>
-                      <a:endParaRPr lang="pt-BR" dirty="0"/>
-                    </a:p>
-                  </a:txBody>
-                  <a:tcPr/>
-                </a:tc>
-                <a:tc>
-                  <a:txBody>
-                    <a:bodyPr/>
-                    <a:lstStyle/>
-                    <a:p>
-                      <a:endParaRPr lang="pt-BR" dirty="0">
-                        <a:solidFill>
-                          <a:srgbClr val="FF0000"/>
-                        </a:solidFill>
-                      </a:endParaRPr>
-                    </a:p>
-                  </a:txBody>
-                  <a:tcPr/>
-                </a:tc>
-                <a:tc>
-                  <a:txBody>
-                    <a:bodyPr/>
-                    <a:lstStyle/>
-                    <a:p>
-                      <a:endParaRPr lang="pt-BR" dirty="0">
-                        <a:solidFill>
-                          <a:srgbClr val="FF0000"/>
-                        </a:solidFill>
-                      </a:endParaRPr>
-                    </a:p>
-                  </a:txBody>
-                  <a:tcPr/>
-                </a:tc>
-                <a:tc>
-                  <a:txBody>
-                    <a:bodyPr/>
-                    <a:lstStyle/>
-                    <a:p>
-                      <a:endParaRPr lang="pt-BR" dirty="0">
-                        <a:solidFill>
-                          <a:srgbClr val="FF0000"/>
-                        </a:solidFill>
-                      </a:endParaRPr>
-                    </a:p>
-                  </a:txBody>
-                  <a:tcPr/>
-                </a:tc>
-              </a:tr>
-              <a:tr h="497939">
-                <a:tc>
-                  <a:txBody>
-                    <a:bodyPr/>
-                    <a:lstStyle/>
-                    <a:p>
-                      <a:pPr algn="ctr"/>
-                      <a:r>
-                        <a:rPr lang="pt-BR" dirty="0" smtClean="0"/>
-                        <a:t>*</a:t>
-                      </a:r>
-                      <a:endParaRPr lang="pt-BR" dirty="0"/>
-                    </a:p>
-                  </a:txBody>
-                  <a:tcPr/>
-                </a:tc>
-                <a:tc>
-                  <a:txBody>
-                    <a:bodyPr/>
-                    <a:lstStyle/>
-                    <a:p>
-                      <a:endParaRPr lang="pt-BR"/>
                     </a:p>
                   </a:txBody>
                   <a:tcPr/>
@@ -4234,99 +4056,9 @@
                     <a:lstStyle/>
                     <a:p>
                       <a:r>
-                        <a:rPr lang="pt-BR" dirty="0" smtClean="0"/>
-                        <a:t>30°</a:t>
+                        <a:rPr lang="pt-BR" dirty="0"/>
+                        <a:t>15°</a:t>
                       </a:r>
-                      <a:endParaRPr lang="pt-BR" dirty="0"/>
-                    </a:p>
-                  </a:txBody>
-                  <a:tcPr/>
-                </a:tc>
-                <a:tc>
-                  <a:txBody>
-                    <a:bodyPr/>
-                    <a:lstStyle/>
-                    <a:p>
-                      <a:endParaRPr lang="pt-BR"/>
-                    </a:p>
-                  </a:txBody>
-                  <a:tcPr/>
-                </a:tc>
-                <a:tc>
-                  <a:txBody>
-                    <a:bodyPr/>
-                    <a:lstStyle/>
-                    <a:p>
-                      <a:endParaRPr lang="pt-BR"/>
-                    </a:p>
-                  </a:txBody>
-                  <a:tcPr/>
-                </a:tc>
-                <a:tc>
-                  <a:txBody>
-                    <a:bodyPr/>
-                    <a:lstStyle/>
-                    <a:p>
-                      <a:endParaRPr lang="pt-BR" dirty="0">
-                        <a:solidFill>
-                          <a:srgbClr val="FF0000"/>
-                        </a:solidFill>
-                      </a:endParaRPr>
-                    </a:p>
-                  </a:txBody>
-                  <a:tcPr/>
-                </a:tc>
-                <a:tc>
-                  <a:txBody>
-                    <a:bodyPr/>
-                    <a:lstStyle/>
-                    <a:p>
-                      <a:endParaRPr lang="pt-BR" dirty="0">
-                        <a:solidFill>
-                          <a:srgbClr val="FF0000"/>
-                        </a:solidFill>
-                      </a:endParaRPr>
-                    </a:p>
-                  </a:txBody>
-                  <a:tcPr/>
-                </a:tc>
-                <a:tc>
-                  <a:txBody>
-                    <a:bodyPr/>
-                    <a:lstStyle/>
-                    <a:p>
-                      <a:endParaRPr lang="pt-BR" dirty="0">
-                        <a:solidFill>
-                          <a:srgbClr val="FF0000"/>
-                        </a:solidFill>
-                      </a:endParaRPr>
-                    </a:p>
-                  </a:txBody>
-                  <a:tcPr/>
-                </a:tc>
-              </a:tr>
-              <a:tr h="497939">
-                <a:tc>
-                  <a:txBody>
-                    <a:bodyPr/>
-                    <a:lstStyle/>
-                    <a:p>
-                      <a:pPr algn="ctr"/>
-                      <a:r>
-                        <a:rPr lang="pt-BR" dirty="0" smtClean="0"/>
-                        <a:t>*</a:t>
-                      </a:r>
-                      <a:endParaRPr lang="pt-BR" dirty="0"/>
-                    </a:p>
-                  </a:txBody>
-                  <a:tcPr/>
-                </a:tc>
-                <a:tc>
-                  <a:txBody>
-                    <a:bodyPr/>
-                    <a:lstStyle/>
-                    <a:p>
-                      <a:endParaRPr lang="pt-BR"/>
                     </a:p>
                   </a:txBody>
                   <a:tcPr/>
@@ -4337,99 +4069,9 @@
                     <a:lstStyle/>
                     <a:p>
                       <a:r>
-                        <a:rPr lang="pt-BR" dirty="0" smtClean="0"/>
-                        <a:t>45°</a:t>
+                        <a:rPr lang="pt-BR" dirty="0"/>
+                        <a:t>100</a:t>
                       </a:r>
-                      <a:endParaRPr lang="pt-BR" dirty="0"/>
-                    </a:p>
-                  </a:txBody>
-                  <a:tcPr/>
-                </a:tc>
-                <a:tc>
-                  <a:txBody>
-                    <a:bodyPr/>
-                    <a:lstStyle/>
-                    <a:p>
-                      <a:endParaRPr lang="pt-BR"/>
-                    </a:p>
-                  </a:txBody>
-                  <a:tcPr/>
-                </a:tc>
-                <a:tc>
-                  <a:txBody>
-                    <a:bodyPr/>
-                    <a:lstStyle/>
-                    <a:p>
-                      <a:endParaRPr lang="pt-BR"/>
-                    </a:p>
-                  </a:txBody>
-                  <a:tcPr/>
-                </a:tc>
-                <a:tc>
-                  <a:txBody>
-                    <a:bodyPr/>
-                    <a:lstStyle/>
-                    <a:p>
-                      <a:endParaRPr lang="pt-BR">
-                        <a:solidFill>
-                          <a:srgbClr val="FF0000"/>
-                        </a:solidFill>
-                      </a:endParaRPr>
-                    </a:p>
-                  </a:txBody>
-                  <a:tcPr/>
-                </a:tc>
-                <a:tc>
-                  <a:txBody>
-                    <a:bodyPr/>
-                    <a:lstStyle/>
-                    <a:p>
-                      <a:endParaRPr lang="pt-BR">
-                        <a:solidFill>
-                          <a:srgbClr val="FF0000"/>
-                        </a:solidFill>
-                      </a:endParaRPr>
-                    </a:p>
-                  </a:txBody>
-                  <a:tcPr/>
-                </a:tc>
-                <a:tc>
-                  <a:txBody>
-                    <a:bodyPr/>
-                    <a:lstStyle/>
-                    <a:p>
-                      <a:endParaRPr lang="pt-BR" dirty="0">
-                        <a:solidFill>
-                          <a:srgbClr val="FF0000"/>
-                        </a:solidFill>
-                      </a:endParaRPr>
-                    </a:p>
-                  </a:txBody>
-                  <a:tcPr/>
-                </a:tc>
-              </a:tr>
-              <a:tr h="497939">
-                <a:tc>
-                  <a:txBody>
-                    <a:bodyPr/>
-                    <a:lstStyle/>
-                    <a:p>
-                      <a:pPr algn="ctr"/>
-                      <a:r>
-                        <a:rPr lang="pt-BR" dirty="0" smtClean="0"/>
-                        <a:t>*</a:t>
-                      </a:r>
-                      <a:endParaRPr lang="pt-BR" dirty="0"/>
-                    </a:p>
-                  </a:txBody>
-                  <a:tcPr/>
-                </a:tc>
-                <a:tc>
-                  <a:txBody>
-                    <a:bodyPr/>
-                    <a:lstStyle/>
-                    <a:p>
-                      <a:endParaRPr lang="pt-BR"/>
                     </a:p>
                   </a:txBody>
                   <a:tcPr/>
@@ -4440,99 +4082,9 @@
                     <a:lstStyle/>
                     <a:p>
                       <a:r>
-                        <a:rPr lang="pt-BR" dirty="0" smtClean="0"/>
-                        <a:t>60°</a:t>
+                        <a:rPr lang="pt-BR" dirty="0"/>
+                        <a:t>-9,8</a:t>
                       </a:r>
-                      <a:endParaRPr lang="pt-BR" dirty="0"/>
-                    </a:p>
-                  </a:txBody>
-                  <a:tcPr/>
-                </a:tc>
-                <a:tc>
-                  <a:txBody>
-                    <a:bodyPr/>
-                    <a:lstStyle/>
-                    <a:p>
-                      <a:endParaRPr lang="pt-BR"/>
-                    </a:p>
-                  </a:txBody>
-                  <a:tcPr/>
-                </a:tc>
-                <a:tc>
-                  <a:txBody>
-                    <a:bodyPr/>
-                    <a:lstStyle/>
-                    <a:p>
-                      <a:endParaRPr lang="pt-BR"/>
-                    </a:p>
-                  </a:txBody>
-                  <a:tcPr/>
-                </a:tc>
-                <a:tc>
-                  <a:txBody>
-                    <a:bodyPr/>
-                    <a:lstStyle/>
-                    <a:p>
-                      <a:endParaRPr lang="pt-BR">
-                        <a:solidFill>
-                          <a:srgbClr val="FF0000"/>
-                        </a:solidFill>
-                      </a:endParaRPr>
-                    </a:p>
-                  </a:txBody>
-                  <a:tcPr/>
-                </a:tc>
-                <a:tc>
-                  <a:txBody>
-                    <a:bodyPr/>
-                    <a:lstStyle/>
-                    <a:p>
-                      <a:endParaRPr lang="pt-BR">
-                        <a:solidFill>
-                          <a:srgbClr val="FF0000"/>
-                        </a:solidFill>
-                      </a:endParaRPr>
-                    </a:p>
-                  </a:txBody>
-                  <a:tcPr/>
-                </a:tc>
-                <a:tc>
-                  <a:txBody>
-                    <a:bodyPr/>
-                    <a:lstStyle/>
-                    <a:p>
-                      <a:endParaRPr lang="pt-BR" dirty="0">
-                        <a:solidFill>
-                          <a:srgbClr val="FF0000"/>
-                        </a:solidFill>
-                      </a:endParaRPr>
-                    </a:p>
-                  </a:txBody>
-                  <a:tcPr/>
-                </a:tc>
-              </a:tr>
-              <a:tr h="497939">
-                <a:tc>
-                  <a:txBody>
-                    <a:bodyPr/>
-                    <a:lstStyle/>
-                    <a:p>
-                      <a:pPr algn="ctr"/>
-                      <a:r>
-                        <a:rPr lang="pt-BR" dirty="0" smtClean="0"/>
-                        <a:t>*</a:t>
-                      </a:r>
-                      <a:endParaRPr lang="pt-BR" dirty="0"/>
-                    </a:p>
-                  </a:txBody>
-                  <a:tcPr/>
-                </a:tc>
-                <a:tc>
-                  <a:txBody>
-                    <a:bodyPr/>
-                    <a:lstStyle/>
-                    <a:p>
-                      <a:endParaRPr lang="pt-BR"/>
                     </a:p>
                   </a:txBody>
                   <a:tcPr/>
@@ -4543,99 +4095,13 @@
                     <a:lstStyle/>
                     <a:p>
                       <a:r>
-                        <a:rPr lang="pt-BR" dirty="0" smtClean="0"/>
-                        <a:t>75°</a:t>
+                        <a:rPr lang="pt-BR" dirty="0">
+                          <a:solidFill>
+                            <a:srgbClr val="FF0000"/>
+                          </a:solidFill>
+                        </a:rPr>
+                        <a:t>34.18</a:t>
                       </a:r>
-                      <a:endParaRPr lang="pt-BR" dirty="0"/>
-                    </a:p>
-                  </a:txBody>
-                  <a:tcPr/>
-                </a:tc>
-                <a:tc>
-                  <a:txBody>
-                    <a:bodyPr/>
-                    <a:lstStyle/>
-                    <a:p>
-                      <a:endParaRPr lang="pt-BR"/>
-                    </a:p>
-                  </a:txBody>
-                  <a:tcPr/>
-                </a:tc>
-                <a:tc>
-                  <a:txBody>
-                    <a:bodyPr/>
-                    <a:lstStyle/>
-                    <a:p>
-                      <a:endParaRPr lang="pt-BR"/>
-                    </a:p>
-                  </a:txBody>
-                  <a:tcPr/>
-                </a:tc>
-                <a:tc>
-                  <a:txBody>
-                    <a:bodyPr/>
-                    <a:lstStyle/>
-                    <a:p>
-                      <a:endParaRPr lang="pt-BR">
-                        <a:solidFill>
-                          <a:srgbClr val="FF0000"/>
-                        </a:solidFill>
-                      </a:endParaRPr>
-                    </a:p>
-                  </a:txBody>
-                  <a:tcPr/>
-                </a:tc>
-                <a:tc>
-                  <a:txBody>
-                    <a:bodyPr/>
-                    <a:lstStyle/>
-                    <a:p>
-                      <a:endParaRPr lang="pt-BR">
-                        <a:solidFill>
-                          <a:srgbClr val="FF0000"/>
-                        </a:solidFill>
-                      </a:endParaRPr>
-                    </a:p>
-                  </a:txBody>
-                  <a:tcPr/>
-                </a:tc>
-                <a:tc>
-                  <a:txBody>
-                    <a:bodyPr/>
-                    <a:lstStyle/>
-                    <a:p>
-                      <a:endParaRPr lang="pt-BR" dirty="0">
-                        <a:solidFill>
-                          <a:srgbClr val="FF0000"/>
-                        </a:solidFill>
-                      </a:endParaRPr>
-                    </a:p>
-                  </a:txBody>
-                  <a:tcPr/>
-                </a:tc>
-              </a:tr>
-              <a:tr h="497939">
-                <a:tc>
-                  <a:txBody>
-                    <a:bodyPr/>
-                    <a:lstStyle/>
-                    <a:p>
-                      <a:pPr algn="ctr"/>
-                      <a:r>
-                        <a:rPr lang="pt-BR" dirty="0" smtClean="0"/>
-                        <a:t>*</a:t>
-                      </a:r>
-                      <a:endParaRPr lang="pt-BR" dirty="0"/>
-                    </a:p>
-                  </a:txBody>
-                  <a:tcPr/>
-                </a:tc>
-                <a:tc>
-                  <a:txBody>
-                    <a:bodyPr/>
-                    <a:lstStyle/>
-                    <a:p>
-                      <a:endParaRPr lang="pt-BR" dirty="0"/>
                     </a:p>
                   </a:txBody>
                   <a:tcPr/>
@@ -4646,10 +4112,13 @@
                     <a:lstStyle/>
                     <a:p>
                       <a:r>
-                        <a:rPr lang="pt-BR" dirty="0" smtClean="0"/>
-                        <a:t>85°</a:t>
+                        <a:rPr lang="pt-BR" dirty="0">
+                          <a:solidFill>
+                            <a:srgbClr val="FF0000"/>
+                          </a:solidFill>
+                        </a:rPr>
+                        <a:t>510.20</a:t>
                       </a:r>
-                      <a:endParaRPr lang="pt-BR" dirty="0"/>
                     </a:p>
                   </a:txBody>
                   <a:tcPr/>
@@ -4659,7 +4128,35 @@
                     <a:bodyPr/>
                     <a:lstStyle/>
                     <a:p>
-                      <a:endParaRPr lang="pt-BR" dirty="0"/>
+                      <a:r>
+                        <a:rPr lang="pt-BR" dirty="0">
+                          <a:solidFill>
+                            <a:srgbClr val="FF0000"/>
+                          </a:solidFill>
+                        </a:rPr>
+                        <a:t>5.28</a:t>
+                      </a:r>
+                    </a:p>
+                  </a:txBody>
+                  <a:tcPr/>
+                </a:tc>
+                <a:extLst>
+                  <a:ext uri="{0D108BD9-81ED-4DB2-BD59-A6C34878D82A}">
+                    <a16:rowId xmlns:a16="http://schemas.microsoft.com/office/drawing/2014/main" val="10001"/>
+                  </a:ext>
+                </a:extLst>
+              </a:tr>
+              <a:tr h="497939">
+                <a:tc>
+                  <a:txBody>
+                    <a:bodyPr/>
+                    <a:lstStyle/>
+                    <a:p>
+                      <a:pPr algn="ctr"/>
+                      <a:r>
+                        <a:rPr lang="pt-BR" dirty="0"/>
+                        <a:t>*</a:t>
+                      </a:r>
                     </a:p>
                   </a:txBody>
                   <a:tcPr/>
@@ -4669,7 +4166,10 @@
                     <a:bodyPr/>
                     <a:lstStyle/>
                     <a:p>
-                      <a:endParaRPr lang="pt-BR"/>
+                      <a:r>
+                        <a:rPr lang="pt-BR" dirty="0"/>
+                        <a:t>0</a:t>
+                      </a:r>
                     </a:p>
                   </a:txBody>
                   <a:tcPr/>
@@ -4679,11 +4179,10 @@
                     <a:bodyPr/>
                     <a:lstStyle/>
                     <a:p>
-                      <a:endParaRPr lang="pt-BR" dirty="0">
-                        <a:solidFill>
-                          <a:srgbClr val="FF0000"/>
-                        </a:solidFill>
-                      </a:endParaRPr>
+                      <a:r>
+                        <a:rPr lang="pt-BR" dirty="0"/>
+                        <a:t>15°</a:t>
+                      </a:r>
                     </a:p>
                   </a:txBody>
                   <a:tcPr/>
@@ -4693,11 +4192,10 @@
                     <a:bodyPr/>
                     <a:lstStyle/>
                     <a:p>
-                      <a:endParaRPr lang="pt-BR" dirty="0">
-                        <a:solidFill>
-                          <a:srgbClr val="FF0000"/>
-                        </a:solidFill>
-                      </a:endParaRPr>
+                      <a:r>
+                        <a:rPr lang="pt-BR" dirty="0"/>
+                        <a:t>100</a:t>
+                      </a:r>
                     </a:p>
                   </a:txBody>
                   <a:tcPr/>
@@ -4707,15 +4205,617 @@
                     <a:bodyPr/>
                     <a:lstStyle/>
                     <a:p>
-                      <a:endParaRPr lang="pt-BR" dirty="0">
-                        <a:solidFill>
-                          <a:srgbClr val="FF0000"/>
-                        </a:solidFill>
-                      </a:endParaRPr>
+                      <a:r>
+                        <a:rPr lang="pt-BR" dirty="0"/>
+                        <a:t>-24.8</a:t>
+                      </a:r>
                     </a:p>
                   </a:txBody>
                   <a:tcPr/>
                 </a:tc>
+                <a:tc>
+                  <a:txBody>
+                    <a:bodyPr/>
+                    <a:lstStyle/>
+                    <a:p>
+                      <a:r>
+                        <a:rPr lang="pt-BR" dirty="0">
+                          <a:solidFill>
+                            <a:srgbClr val="FF0000"/>
+                          </a:solidFill>
+                        </a:rPr>
+                        <a:t>13.51</a:t>
+                      </a:r>
+                    </a:p>
+                  </a:txBody>
+                  <a:tcPr/>
+                </a:tc>
+                <a:tc>
+                  <a:txBody>
+                    <a:bodyPr/>
+                    <a:lstStyle/>
+                    <a:p>
+                      <a:r>
+                        <a:rPr lang="pt-BR" dirty="0">
+                          <a:solidFill>
+                            <a:srgbClr val="FF0000"/>
+                          </a:solidFill>
+                        </a:rPr>
+                        <a:t>201.61</a:t>
+                      </a:r>
+                    </a:p>
+                  </a:txBody>
+                  <a:tcPr/>
+                </a:tc>
+                <a:tc>
+                  <a:txBody>
+                    <a:bodyPr/>
+                    <a:lstStyle/>
+                    <a:p>
+                      <a:r>
+                        <a:rPr lang="pt-BR" dirty="0">
+                          <a:solidFill>
+                            <a:srgbClr val="FF0000"/>
+                          </a:solidFill>
+                        </a:rPr>
+                        <a:t>2.09</a:t>
+                      </a:r>
+                    </a:p>
+                  </a:txBody>
+                  <a:tcPr/>
+                </a:tc>
+                <a:extLst>
+                  <a:ext uri="{0D108BD9-81ED-4DB2-BD59-A6C34878D82A}">
+                    <a16:rowId xmlns:a16="http://schemas.microsoft.com/office/drawing/2014/main" val="10002"/>
+                  </a:ext>
+                </a:extLst>
+              </a:tr>
+              <a:tr h="497939">
+                <a:tc>
+                  <a:txBody>
+                    <a:bodyPr/>
+                    <a:lstStyle/>
+                    <a:p>
+                      <a:pPr algn="ctr"/>
+                      <a:r>
+                        <a:rPr lang="pt-BR" dirty="0"/>
+                        <a:t>*</a:t>
+                      </a:r>
+                    </a:p>
+                  </a:txBody>
+                  <a:tcPr/>
+                </a:tc>
+                <a:tc>
+                  <a:txBody>
+                    <a:bodyPr/>
+                    <a:lstStyle/>
+                    <a:p>
+                      <a:r>
+                        <a:rPr lang="pt-BR" dirty="0"/>
+                        <a:t>0</a:t>
+                      </a:r>
+                    </a:p>
+                  </a:txBody>
+                  <a:tcPr/>
+                </a:tc>
+                <a:tc>
+                  <a:txBody>
+                    <a:bodyPr/>
+                    <a:lstStyle/>
+                    <a:p>
+                      <a:r>
+                        <a:rPr lang="pt-BR" dirty="0"/>
+                        <a:t>30°</a:t>
+                      </a:r>
+                    </a:p>
+                  </a:txBody>
+                  <a:tcPr/>
+                </a:tc>
+                <a:tc>
+                  <a:txBody>
+                    <a:bodyPr/>
+                    <a:lstStyle/>
+                    <a:p>
+                      <a:r>
+                        <a:rPr lang="pt-BR" dirty="0"/>
+                        <a:t>100</a:t>
+                      </a:r>
+                    </a:p>
+                  </a:txBody>
+                  <a:tcPr/>
+                </a:tc>
+                <a:tc>
+                  <a:txBody>
+                    <a:bodyPr/>
+                    <a:lstStyle/>
+                    <a:p>
+                      <a:r>
+                        <a:rPr lang="pt-BR" dirty="0"/>
+                        <a:t>-9.8</a:t>
+                      </a:r>
+                    </a:p>
+                  </a:txBody>
+                  <a:tcPr/>
+                </a:tc>
+                <a:tc>
+                  <a:txBody>
+                    <a:bodyPr/>
+                    <a:lstStyle/>
+                    <a:p>
+                      <a:r>
+                        <a:rPr lang="pt-BR" dirty="0">
+                          <a:solidFill>
+                            <a:srgbClr val="FF0000"/>
+                          </a:solidFill>
+                        </a:rPr>
+                        <a:t>127.55</a:t>
+                      </a:r>
+                    </a:p>
+                  </a:txBody>
+                  <a:tcPr/>
+                </a:tc>
+                <a:tc>
+                  <a:txBody>
+                    <a:bodyPr/>
+                    <a:lstStyle/>
+                    <a:p>
+                      <a:r>
+                        <a:rPr lang="pt-BR" dirty="0">
+                          <a:solidFill>
+                            <a:srgbClr val="FF0000"/>
+                          </a:solidFill>
+                        </a:rPr>
+                        <a:t>883.70</a:t>
+                      </a:r>
+                    </a:p>
+                  </a:txBody>
+                  <a:tcPr/>
+                </a:tc>
+                <a:tc>
+                  <a:txBody>
+                    <a:bodyPr/>
+                    <a:lstStyle/>
+                    <a:p>
+                      <a:r>
+                        <a:rPr lang="pt-BR" dirty="0">
+                          <a:solidFill>
+                            <a:srgbClr val="FF0000"/>
+                          </a:solidFill>
+                        </a:rPr>
+                        <a:t>10.20</a:t>
+                      </a:r>
+                    </a:p>
+                  </a:txBody>
+                  <a:tcPr/>
+                </a:tc>
+                <a:extLst>
+                  <a:ext uri="{0D108BD9-81ED-4DB2-BD59-A6C34878D82A}">
+                    <a16:rowId xmlns:a16="http://schemas.microsoft.com/office/drawing/2014/main" val="10003"/>
+                  </a:ext>
+                </a:extLst>
+              </a:tr>
+              <a:tr h="497939">
+                <a:tc>
+                  <a:txBody>
+                    <a:bodyPr/>
+                    <a:lstStyle/>
+                    <a:p>
+                      <a:pPr algn="ctr"/>
+                      <a:r>
+                        <a:rPr lang="pt-BR" dirty="0"/>
+                        <a:t>*</a:t>
+                      </a:r>
+                    </a:p>
+                  </a:txBody>
+                  <a:tcPr/>
+                </a:tc>
+                <a:tc>
+                  <a:txBody>
+                    <a:bodyPr/>
+                    <a:lstStyle/>
+                    <a:p>
+                      <a:r>
+                        <a:rPr lang="pt-BR" dirty="0"/>
+                        <a:t>0</a:t>
+                      </a:r>
+                    </a:p>
+                  </a:txBody>
+                  <a:tcPr/>
+                </a:tc>
+                <a:tc>
+                  <a:txBody>
+                    <a:bodyPr/>
+                    <a:lstStyle/>
+                    <a:p>
+                      <a:r>
+                        <a:rPr lang="pt-BR" dirty="0"/>
+                        <a:t>30°</a:t>
+                      </a:r>
+                    </a:p>
+                  </a:txBody>
+                  <a:tcPr/>
+                </a:tc>
+                <a:tc>
+                  <a:txBody>
+                    <a:bodyPr/>
+                    <a:lstStyle/>
+                    <a:p>
+                      <a:r>
+                        <a:rPr lang="pt-BR" dirty="0"/>
+                        <a:t>100</a:t>
+                      </a:r>
+                    </a:p>
+                  </a:txBody>
+                  <a:tcPr/>
+                </a:tc>
+                <a:tc>
+                  <a:txBody>
+                    <a:bodyPr/>
+                    <a:lstStyle/>
+                    <a:p>
+                      <a:r>
+                        <a:rPr lang="pt-BR" dirty="0"/>
+                        <a:t>-24.8</a:t>
+                      </a:r>
+                    </a:p>
+                  </a:txBody>
+                  <a:tcPr/>
+                </a:tc>
+                <a:tc>
+                  <a:txBody>
+                    <a:bodyPr/>
+                    <a:lstStyle/>
+                    <a:p>
+                      <a:r>
+                        <a:rPr lang="pt-BR" dirty="0">
+                          <a:solidFill>
+                            <a:srgbClr val="FF0000"/>
+                          </a:solidFill>
+                        </a:rPr>
+                        <a:t>50.40</a:t>
+                      </a:r>
+                    </a:p>
+                  </a:txBody>
+                  <a:tcPr/>
+                </a:tc>
+                <a:tc>
+                  <a:txBody>
+                    <a:bodyPr/>
+                    <a:lstStyle/>
+                    <a:p>
+                      <a:r>
+                        <a:rPr lang="pt-BR" dirty="0">
+                          <a:solidFill>
+                            <a:srgbClr val="FF0000"/>
+                          </a:solidFill>
+                        </a:rPr>
+                        <a:t>349.2</a:t>
+                      </a:r>
+                    </a:p>
+                  </a:txBody>
+                  <a:tcPr/>
+                </a:tc>
+                <a:tc>
+                  <a:txBody>
+                    <a:bodyPr/>
+                    <a:lstStyle/>
+                    <a:p>
+                      <a:r>
+                        <a:rPr lang="pt-BR" dirty="0">
+                          <a:solidFill>
+                            <a:srgbClr val="FF0000"/>
+                          </a:solidFill>
+                        </a:rPr>
+                        <a:t>4.03</a:t>
+                      </a:r>
+                    </a:p>
+                  </a:txBody>
+                  <a:tcPr/>
+                </a:tc>
+                <a:extLst>
+                  <a:ext uri="{0D108BD9-81ED-4DB2-BD59-A6C34878D82A}">
+                    <a16:rowId xmlns:a16="http://schemas.microsoft.com/office/drawing/2014/main" val="10004"/>
+                  </a:ext>
+                </a:extLst>
+              </a:tr>
+              <a:tr h="497939">
+                <a:tc>
+                  <a:txBody>
+                    <a:bodyPr/>
+                    <a:lstStyle/>
+                    <a:p>
+                      <a:pPr algn="ctr"/>
+                      <a:r>
+                        <a:rPr lang="pt-BR" dirty="0"/>
+                        <a:t>*</a:t>
+                      </a:r>
+                    </a:p>
+                  </a:txBody>
+                  <a:tcPr/>
+                </a:tc>
+                <a:tc>
+                  <a:txBody>
+                    <a:bodyPr/>
+                    <a:lstStyle/>
+                    <a:p>
+                      <a:r>
+                        <a:rPr lang="pt-BR" dirty="0"/>
+                        <a:t>0</a:t>
+                      </a:r>
+                    </a:p>
+                  </a:txBody>
+                  <a:tcPr/>
+                </a:tc>
+                <a:tc>
+                  <a:txBody>
+                    <a:bodyPr/>
+                    <a:lstStyle/>
+                    <a:p>
+                      <a:r>
+                        <a:rPr lang="pt-BR" dirty="0"/>
+                        <a:t>45°</a:t>
+                      </a:r>
+                    </a:p>
+                  </a:txBody>
+                  <a:tcPr/>
+                </a:tc>
+                <a:tc>
+                  <a:txBody>
+                    <a:bodyPr/>
+                    <a:lstStyle/>
+                    <a:p>
+                      <a:r>
+                        <a:rPr lang="pt-BR" dirty="0"/>
+                        <a:t>100</a:t>
+                      </a:r>
+                    </a:p>
+                  </a:txBody>
+                  <a:tcPr/>
+                </a:tc>
+                <a:tc>
+                  <a:txBody>
+                    <a:bodyPr/>
+                    <a:lstStyle/>
+                    <a:p>
+                      <a:pPr marL="0" marR="0" lvl="0" indent="0" algn="l" defTabSz="914400" rtl="0" eaLnBrk="1" fontAlgn="auto" latinLnBrk="0" hangingPunct="1">
+                        <a:lnSpc>
+                          <a:spcPct val="100000"/>
+                        </a:lnSpc>
+                        <a:spcBef>
+                          <a:spcPts val="0"/>
+                        </a:spcBef>
+                        <a:spcAft>
+                          <a:spcPts val="0"/>
+                        </a:spcAft>
+                        <a:buClrTx/>
+                        <a:buSzTx/>
+                        <a:buFontTx/>
+                        <a:buNone/>
+                        <a:tabLst/>
+                        <a:defRPr/>
+                      </a:pPr>
+                      <a:r>
+                        <a:rPr lang="pt-BR" dirty="0"/>
+                        <a:t>-9.8</a:t>
+                      </a:r>
+                    </a:p>
+                  </a:txBody>
+                  <a:tcPr/>
+                </a:tc>
+                <a:tc>
+                  <a:txBody>
+                    <a:bodyPr/>
+                    <a:lstStyle/>
+                    <a:p>
+                      <a:r>
+                        <a:rPr lang="pt-BR" dirty="0">
+                          <a:solidFill>
+                            <a:srgbClr val="FF0000"/>
+                          </a:solidFill>
+                        </a:rPr>
+                        <a:t>255.10</a:t>
+                      </a:r>
+                    </a:p>
+                  </a:txBody>
+                  <a:tcPr/>
+                </a:tc>
+                <a:tc>
+                  <a:txBody>
+                    <a:bodyPr/>
+                    <a:lstStyle/>
+                    <a:p>
+                      <a:pPr marL="0" marR="0" lvl="0" indent="0" algn="l" defTabSz="914400" rtl="0" eaLnBrk="1" fontAlgn="auto" latinLnBrk="0" hangingPunct="1">
+                        <a:lnSpc>
+                          <a:spcPct val="100000"/>
+                        </a:lnSpc>
+                        <a:spcBef>
+                          <a:spcPts val="0"/>
+                        </a:spcBef>
+                        <a:spcAft>
+                          <a:spcPts val="0"/>
+                        </a:spcAft>
+                        <a:buClrTx/>
+                        <a:buSzTx/>
+                        <a:buFontTx/>
+                        <a:buNone/>
+                        <a:tabLst/>
+                        <a:defRPr/>
+                      </a:pPr>
+                      <a:r>
+                        <a:rPr lang="pt-BR" dirty="0">
+                          <a:solidFill>
+                            <a:srgbClr val="FF0000"/>
+                          </a:solidFill>
+                        </a:rPr>
+                        <a:t>1020.41</a:t>
+                      </a:r>
+                    </a:p>
+                  </a:txBody>
+                  <a:tcPr/>
+                </a:tc>
+                <a:tc>
+                  <a:txBody>
+                    <a:bodyPr/>
+                    <a:lstStyle/>
+                    <a:p>
+                      <a:r>
+                        <a:rPr lang="pt-BR" dirty="0">
+                          <a:solidFill>
+                            <a:srgbClr val="FF0000"/>
+                          </a:solidFill>
+                        </a:rPr>
+                        <a:t>14.43</a:t>
+                      </a:r>
+                    </a:p>
+                  </a:txBody>
+                  <a:tcPr/>
+                </a:tc>
+                <a:extLst>
+                  <a:ext uri="{0D108BD9-81ED-4DB2-BD59-A6C34878D82A}">
+                    <a16:rowId xmlns:a16="http://schemas.microsoft.com/office/drawing/2014/main" val="10005"/>
+                  </a:ext>
+                </a:extLst>
+              </a:tr>
+              <a:tr h="497939">
+                <a:tc>
+                  <a:txBody>
+                    <a:bodyPr/>
+                    <a:lstStyle/>
+                    <a:p>
+                      <a:pPr algn="ctr"/>
+                      <a:r>
+                        <a:rPr lang="pt-BR" dirty="0"/>
+                        <a:t>*</a:t>
+                      </a:r>
+                    </a:p>
+                  </a:txBody>
+                  <a:tcPr/>
+                </a:tc>
+                <a:tc>
+                  <a:txBody>
+                    <a:bodyPr/>
+                    <a:lstStyle/>
+                    <a:p>
+                      <a:r>
+                        <a:rPr lang="pt-BR" dirty="0"/>
+                        <a:t>20</a:t>
+                      </a:r>
+                    </a:p>
+                  </a:txBody>
+                  <a:tcPr/>
+                </a:tc>
+                <a:tc>
+                  <a:txBody>
+                    <a:bodyPr/>
+                    <a:lstStyle/>
+                    <a:p>
+                      <a:r>
+                        <a:rPr lang="pt-BR" dirty="0"/>
+                        <a:t>45°</a:t>
+                      </a:r>
+                    </a:p>
+                  </a:txBody>
+                  <a:tcPr/>
+                </a:tc>
+                <a:tc>
+                  <a:txBody>
+                    <a:bodyPr/>
+                    <a:lstStyle/>
+                    <a:p>
+                      <a:r>
+                        <a:rPr lang="pt-BR" dirty="0"/>
+                        <a:t>100</a:t>
+                      </a:r>
+                    </a:p>
+                  </a:txBody>
+                  <a:tcPr/>
+                </a:tc>
+                <a:tc>
+                  <a:txBody>
+                    <a:bodyPr/>
+                    <a:lstStyle/>
+                    <a:p>
+                      <a:pPr marL="0" marR="0" lvl="0" indent="0" algn="l" defTabSz="914400" rtl="0" eaLnBrk="1" fontAlgn="auto" latinLnBrk="0" hangingPunct="1">
+                        <a:lnSpc>
+                          <a:spcPct val="100000"/>
+                        </a:lnSpc>
+                        <a:spcBef>
+                          <a:spcPts val="0"/>
+                        </a:spcBef>
+                        <a:spcAft>
+                          <a:spcPts val="0"/>
+                        </a:spcAft>
+                        <a:buClrTx/>
+                        <a:buSzTx/>
+                        <a:buFontTx/>
+                        <a:buNone/>
+                        <a:tabLst/>
+                        <a:defRPr/>
+                      </a:pPr>
+                      <a:r>
+                        <a:rPr lang="pt-BR" dirty="0"/>
+                        <a:t>-9.8</a:t>
+                      </a:r>
+                    </a:p>
+                  </a:txBody>
+                  <a:tcPr/>
+                </a:tc>
+                <a:tc>
+                  <a:txBody>
+                    <a:bodyPr/>
+                    <a:lstStyle/>
+                    <a:p>
+                      <a:r>
+                        <a:rPr lang="pt-BR" dirty="0">
+                          <a:solidFill>
+                            <a:srgbClr val="FF0000"/>
+                          </a:solidFill>
+                        </a:rPr>
+                        <a:t>275.10</a:t>
+                      </a:r>
+                    </a:p>
+                  </a:txBody>
+                  <a:tcPr/>
+                </a:tc>
+                <a:tc>
+                  <a:txBody>
+                    <a:bodyPr/>
+                    <a:lstStyle/>
+                    <a:p>
+                      <a:r>
+                        <a:rPr lang="pt-BR" dirty="0">
+                          <a:solidFill>
+                            <a:srgbClr val="FF0000"/>
+                          </a:solidFill>
+                        </a:rPr>
+                        <a:t>1040.03</a:t>
+                      </a:r>
+                    </a:p>
+                  </a:txBody>
+                  <a:tcPr/>
+                </a:tc>
+                <a:tc>
+                  <a:txBody>
+                    <a:bodyPr/>
+                    <a:lstStyle/>
+                    <a:p>
+                      <a:r>
+                        <a:rPr lang="pt-BR" dirty="0">
+                          <a:solidFill>
+                            <a:srgbClr val="FF0000"/>
+                          </a:solidFill>
+                        </a:rPr>
+                        <a:t>14.71</a:t>
+                      </a:r>
+                    </a:p>
+                  </a:txBody>
+                  <a:tcPr/>
+                </a:tc>
+                <a:extLst>
+                  <a:ext uri="{0D108BD9-81ED-4DB2-BD59-A6C34878D82A}">
+                    <a16:rowId xmlns:a16="http://schemas.microsoft.com/office/drawing/2014/main" val="10006"/>
+                  </a:ext>
+                </a:extLst>
               </a:tr>
             </a:tbl>
           </a:graphicData>
@@ -4756,7 +4856,7 @@
           <p:cNvPr id="2" name="Título 1">
             <a:extLst>
               <a:ext uri="{FF2B5EF4-FFF2-40B4-BE49-F238E27FC236}">
-                <a16:creationId xmlns:a16="http://schemas.microsoft.com/office/drawing/2014/main" xmlns="" id="{8D4949B0-2116-4E69-8920-091C2A01B638}"/>
+                <a16:creationId xmlns:a16="http://schemas.microsoft.com/office/drawing/2014/main" id="{8D4949B0-2116-4E69-8920-091C2A01B638}"/>
               </a:ext>
             </a:extLst>
           </p:cNvPr>
@@ -4784,7 +4884,7 @@
           <p:cNvPr id="3" name="Espaço Reservado para Conteúdo 2">
             <a:extLst>
               <a:ext uri="{FF2B5EF4-FFF2-40B4-BE49-F238E27FC236}">
-                <a16:creationId xmlns:a16="http://schemas.microsoft.com/office/drawing/2014/main" xmlns="" id="{79E1FF44-5FF9-44BB-8F69-6F25017528AC}"/>
+                <a16:creationId xmlns:a16="http://schemas.microsoft.com/office/drawing/2014/main" id="{79E1FF44-5FF9-44BB-8F69-6F25017528AC}"/>
               </a:ext>
             </a:extLst>
           </p:cNvPr>
@@ -4861,10 +4961,9 @@
           <a:lstStyle/>
           <a:p>
             <a:r>
-              <a:rPr lang="pt-BR" dirty="0" smtClean="0"/>
+              <a:rPr lang="pt-BR" dirty="0"/>
               <a:t>Apresentação</a:t>
             </a:r>
-            <a:endParaRPr lang="pt-BR" dirty="0"/>
           </a:p>
         </p:txBody>
       </p:sp>
@@ -4884,31 +4983,31 @@
           <a:lstStyle/>
           <a:p>
             <a:r>
-              <a:rPr lang="pt-BR" dirty="0" smtClean="0"/>
+              <a:rPr lang="pt-BR" dirty="0"/>
               <a:t>Introdução</a:t>
             </a:r>
           </a:p>
           <a:p>
             <a:r>
-              <a:rPr lang="pt-BR" dirty="0" smtClean="0"/>
+              <a:rPr lang="pt-BR" dirty="0"/>
               <a:t>Definições</a:t>
             </a:r>
           </a:p>
           <a:p>
             <a:r>
-              <a:rPr lang="pt-BR" dirty="0" smtClean="0"/>
+              <a:rPr lang="pt-BR" dirty="0"/>
               <a:t>Desenvolvimento</a:t>
             </a:r>
           </a:p>
           <a:p>
             <a:r>
-              <a:rPr lang="pt-BR" dirty="0" smtClean="0"/>
+              <a:rPr lang="pt-BR" dirty="0"/>
               <a:t>Aplicação</a:t>
             </a:r>
           </a:p>
           <a:p>
             <a:r>
-              <a:rPr lang="pt-BR" dirty="0" smtClean="0"/>
+              <a:rPr lang="pt-BR" dirty="0"/>
               <a:t>Referências</a:t>
             </a:r>
           </a:p>
@@ -4952,7 +5051,7 @@
           <p:cNvPr id="2" name="Título 1">
             <a:extLst>
               <a:ext uri="{FF2B5EF4-FFF2-40B4-BE49-F238E27FC236}">
-                <a16:creationId xmlns:a16="http://schemas.microsoft.com/office/drawing/2014/main" xmlns="" id="{CD585B40-EB7A-4A3E-AC0D-A0915D884629}"/>
+                <a16:creationId xmlns:a16="http://schemas.microsoft.com/office/drawing/2014/main" id="{CD585B40-EB7A-4A3E-AC0D-A0915D884629}"/>
               </a:ext>
             </a:extLst>
           </p:cNvPr>
@@ -4980,7 +5079,7 @@
           <p:cNvPr id="3" name="Espaço Reservado para Conteúdo 2">
             <a:extLst>
               <a:ext uri="{FF2B5EF4-FFF2-40B4-BE49-F238E27FC236}">
-                <a16:creationId xmlns:a16="http://schemas.microsoft.com/office/drawing/2014/main" xmlns="" id="{C1961CF7-B8AE-45BD-A9CC-0FFC6ED2262E}"/>
+                <a16:creationId xmlns:a16="http://schemas.microsoft.com/office/drawing/2014/main" id="{C1961CF7-B8AE-45BD-A9CC-0FFC6ED2262E}"/>
               </a:ext>
             </a:extLst>
           </p:cNvPr>
@@ -5013,49 +5112,27 @@
               <a:t>lançamentos parabólicos </a:t>
             </a:r>
             <a:r>
-              <a:rPr lang="pt-BR" dirty="0" smtClean="0"/>
-              <a:t>são dois </a:t>
-            </a:r>
-            <a:r>
               <a:rPr lang="pt-BR" dirty="0"/>
-              <a:t>dos temas mais antigos estudados em física. </a:t>
-            </a:r>
-            <a:endParaRPr lang="pt-BR" dirty="0" smtClean="0"/>
-          </a:p>
-          <a:p>
-            <a:r>
-              <a:rPr lang="pt-BR" dirty="0" smtClean="0"/>
-              <a:t>Desde </a:t>
-            </a:r>
+              <a:t>são dois dos temas mais antigos estudados em física. </a:t>
+            </a:r>
+          </a:p>
+          <a:p>
             <a:r>
               <a:rPr lang="pt-BR" dirty="0"/>
-              <a:t>a época de Aristóteles (384- 322 a.c.) já se buscava entender os diversos tipos de </a:t>
-            </a:r>
-            <a:r>
-              <a:rPr lang="pt-BR" dirty="0" smtClean="0"/>
-              <a:t>movimento.</a:t>
-            </a:r>
-          </a:p>
-          <a:p>
-            <a:r>
-              <a:rPr lang="pt-BR" dirty="0" smtClean="0"/>
-              <a:t>Galileu </a:t>
-            </a:r>
+              <a:t>Desde a época de Aristóteles (384- 322 a.c.) já se buscava entender os diversos tipos de movimento.</a:t>
+            </a:r>
+          </a:p>
+          <a:p>
             <a:r>
               <a:rPr lang="pt-BR" dirty="0"/>
-              <a:t>Galilei (1564-1642) que, através de seus estudos, deu início ao conceito de queda livre e composição de movimentos que temos hoje</a:t>
-            </a:r>
-            <a:r>
-              <a:rPr lang="pt-BR" dirty="0" smtClean="0"/>
-              <a:t>.</a:t>
-            </a:r>
-          </a:p>
-          <a:p>
-            <a:r>
-              <a:rPr lang="pt-BR" dirty="0" smtClean="0"/>
+              <a:t>Galileu Galilei (1564-1642) que, através de seus estudos, deu início ao conceito de queda livre e composição de movimentos que temos hoje.</a:t>
+            </a:r>
+          </a:p>
+          <a:p>
+            <a:r>
+              <a:rPr lang="pt-BR" dirty="0"/>
               <a:t>Citação Galileu: “Se um corpo apresenta movimento composto, cada um dos movimentos componentes se realiza como se os demais não existissem e nome mesmo intervalo de tempo”</a:t>
             </a:r>
-            <a:endParaRPr lang="pt-BR" dirty="0"/>
           </a:p>
         </p:txBody>
       </p:sp>
@@ -5094,7 +5171,7 @@
           <p:cNvPr id="2" name="Título 1">
             <a:extLst>
               <a:ext uri="{FF2B5EF4-FFF2-40B4-BE49-F238E27FC236}">
-                <a16:creationId xmlns:a16="http://schemas.microsoft.com/office/drawing/2014/main" xmlns="" id="{356EB5F3-1572-4BD3-868F-63A3B9B4FF11}"/>
+                <a16:creationId xmlns:a16="http://schemas.microsoft.com/office/drawing/2014/main" id="{356EB5F3-1572-4BD3-868F-63A3B9B4FF11}"/>
               </a:ext>
             </a:extLst>
           </p:cNvPr>
@@ -5122,7 +5199,7 @@
           <p:cNvPr id="3" name="Espaço Reservado para Conteúdo 2">
             <a:extLst>
               <a:ext uri="{FF2B5EF4-FFF2-40B4-BE49-F238E27FC236}">
-                <a16:creationId xmlns:a16="http://schemas.microsoft.com/office/drawing/2014/main" xmlns="" id="{4036E467-4C7B-46E9-9592-F8700628E38D}"/>
+                <a16:creationId xmlns:a16="http://schemas.microsoft.com/office/drawing/2014/main" id="{4036E467-4C7B-46E9-9592-F8700628E38D}"/>
               </a:ext>
             </a:extLst>
           </p:cNvPr>
@@ -5147,37 +5224,29 @@
           <a:p>
             <a:r>
               <a:rPr lang="pt-BR" dirty="0"/>
-              <a:t>O lançamento oblíquo é situação física bastante comum no nosso dia a dia envolve o lançamento vertical ou oblíquo de </a:t>
-            </a:r>
-            <a:r>
-              <a:rPr lang="pt-BR" dirty="0" smtClean="0"/>
-              <a:t>objetos. </a:t>
-            </a:r>
-          </a:p>
-          <a:p>
-            <a:r>
-              <a:rPr lang="pt-BR" b="1" dirty="0" smtClean="0"/>
+              <a:t>O lançamento oblíquo é situação física bastante comum no nosso dia a dia envolve o lançamento vertical ou oblíquo de objetos. </a:t>
+            </a:r>
+          </a:p>
+          <a:p>
+            <a:r>
+              <a:rPr lang="pt-BR" b="1" dirty="0"/>
               <a:t>Exemplos Simples: </a:t>
             </a:r>
             <a:r>
-              <a:rPr lang="pt-BR" dirty="0" smtClean="0"/>
+              <a:rPr lang="pt-BR" dirty="0"/>
               <a:t>saque de vôlei, tiro de meta no futebol, lançar uma bolinha de papel, etc.</a:t>
             </a:r>
           </a:p>
           <a:p>
             <a:r>
-              <a:rPr lang="pt-BR" dirty="0" smtClean="0"/>
+              <a:rPr lang="pt-BR" dirty="0"/>
               <a:t>O lançamento oblíquo é utilizado também em algumas áreas de conhecimento.  </a:t>
             </a:r>
           </a:p>
           <a:p>
             <a:r>
               <a:rPr lang="pt-BR" b="1" dirty="0"/>
-              <a:t>E</a:t>
-            </a:r>
-            <a:r>
-              <a:rPr lang="pt-BR" b="1" dirty="0" smtClean="0"/>
-              <a:t>xemplos Área de Conhecimento: </a:t>
+              <a:t>Exemplos Área de Conhecimento: </a:t>
             </a:r>
           </a:p>
           <a:p>
@@ -5185,93 +5254,37 @@
               <a:buNone/>
             </a:pPr>
             <a:r>
-              <a:rPr lang="pt-BR" dirty="0" smtClean="0"/>
+              <a:rPr lang="pt-BR" dirty="0"/>
               <a:t>Mecânica Newtoniana </a:t>
             </a:r>
             <a:r>
-              <a:rPr lang="pt-BR" dirty="0" smtClean="0">
+              <a:rPr lang="pt-BR" dirty="0">
                 <a:sym typeface="Wingdings" panose="05000000000000000000" pitchFamily="2" charset="2"/>
               </a:rPr>
               <a:t> </a:t>
             </a:r>
             <a:r>
-              <a:rPr lang="pt-BR" dirty="0" smtClean="0"/>
-              <a:t>l</a:t>
-            </a:r>
-            <a:r>
-              <a:rPr lang="pt-BR" dirty="0" smtClean="0"/>
-              <a:t>ançamento </a:t>
-            </a:r>
-            <a:r>
               <a:rPr lang="pt-BR" dirty="0"/>
-              <a:t>oblíquo de uma partícula </a:t>
-            </a:r>
-            <a:r>
-              <a:rPr lang="pt-BR" dirty="0" smtClean="0"/>
-              <a:t>que envolve </a:t>
-            </a:r>
+              <a:t>lançamento oblíquo de uma partícula que envolve gravidade e atrito [Freire et. al];</a:t>
+            </a:r>
+          </a:p>
+          <a:p>
+            <a:pPr marL="0" indent="0">
+              <a:buNone/>
+            </a:pPr>
             <a:r>
               <a:rPr lang="pt-BR" dirty="0"/>
-              <a:t>gravidade e atrito [Freire et. al</a:t>
-            </a:r>
-            <a:r>
-              <a:rPr lang="pt-BR" dirty="0" smtClean="0"/>
-              <a:t>];</a:t>
-            </a:r>
-          </a:p>
-          <a:p>
-            <a:pPr marL="0" indent="0">
-              <a:buNone/>
-            </a:pPr>
-            <a:r>
-              <a:rPr lang="pt-BR" dirty="0" smtClean="0"/>
               <a:t>Engenharia </a:t>
             </a:r>
             <a:r>
-              <a:rPr lang="pt-BR" dirty="0" smtClean="0">
+              <a:rPr lang="pt-BR" dirty="0">
                 <a:sym typeface="Wingdings" panose="05000000000000000000" pitchFamily="2" charset="2"/>
               </a:rPr>
               <a:t> </a:t>
             </a:r>
             <a:r>
               <a:rPr lang="pt-BR" dirty="0"/>
-              <a:t>em </a:t>
-            </a:r>
-            <a:r>
-              <a:rPr lang="pt-BR" dirty="0" smtClean="0"/>
-              <a:t>situações </a:t>
-            </a:r>
-            <a:r>
-              <a:rPr lang="pt-BR" dirty="0"/>
-              <a:t>onde se utilizam explosivos para desobstruir passagens, em </a:t>
-            </a:r>
-            <a:r>
-              <a:rPr lang="pt-BR" dirty="0" smtClean="0"/>
-              <a:t>lançamento </a:t>
-            </a:r>
-            <a:r>
-              <a:rPr lang="pt-BR" dirty="0"/>
-              <a:t>de foguetes e </a:t>
-            </a:r>
-            <a:r>
-              <a:rPr lang="pt-BR" dirty="0" smtClean="0"/>
-              <a:t>também </a:t>
-            </a:r>
-            <a:r>
-              <a:rPr lang="pt-BR" dirty="0"/>
-              <a:t>em </a:t>
-            </a:r>
-            <a:r>
-              <a:rPr lang="pt-BR" dirty="0" smtClean="0"/>
-              <a:t>balística</a:t>
-            </a:r>
-            <a:r>
-              <a:rPr lang="pt-BR" dirty="0"/>
-              <a:t>.</a:t>
-            </a:r>
-            <a:r>
-              <a:rPr lang="pt-BR" dirty="0" smtClean="0"/>
-              <a:t>   </a:t>
+              <a:t>em situações onde se utilizam explosivos para desobstruir passagens, em lançamento de foguetes e também em balística.   </a:t>
             </a:r>
           </a:p>
         </p:txBody>
@@ -5322,10 +5335,9 @@
           <a:lstStyle/>
           <a:p>
             <a:r>
-              <a:rPr lang="pt-BR" dirty="0" smtClean="0"/>
+              <a:rPr lang="pt-BR" dirty="0"/>
               <a:t>Introdução	</a:t>
             </a:r>
-            <a:endParaRPr lang="pt-BR" dirty="0"/>
           </a:p>
         </p:txBody>
       </p:sp>
@@ -5389,7 +5401,7 @@
           <p:cNvPr id="2" name="Título 1">
             <a:extLst>
               <a:ext uri="{FF2B5EF4-FFF2-40B4-BE49-F238E27FC236}">
-                <a16:creationId xmlns:a16="http://schemas.microsoft.com/office/drawing/2014/main" xmlns="" id="{556A2F7B-A8E0-46E3-80E4-DAC018430B18}"/>
+                <a16:creationId xmlns:a16="http://schemas.microsoft.com/office/drawing/2014/main" id="{556A2F7B-A8E0-46E3-80E4-DAC018430B18}"/>
               </a:ext>
             </a:extLst>
           </p:cNvPr>
@@ -5417,7 +5429,7 @@
           <p:cNvPr id="3" name="Espaço Reservado para Conteúdo 2">
             <a:extLst>
               <a:ext uri="{FF2B5EF4-FFF2-40B4-BE49-F238E27FC236}">
-                <a16:creationId xmlns:a16="http://schemas.microsoft.com/office/drawing/2014/main" xmlns="" id="{90E9155A-E90F-4993-8444-4BC3397A6911}"/>
+                <a16:creationId xmlns:a16="http://schemas.microsoft.com/office/drawing/2014/main" id="{90E9155A-E90F-4993-8444-4BC3397A6911}"/>
               </a:ext>
             </a:extLst>
           </p:cNvPr>
@@ -5453,76 +5465,50 @@
             </a:r>
             <a:r>
               <a:rPr lang="pt-BR" dirty="0"/>
-              <a:t>. Assim, ao mesmo tempo em que o objeto vai para frente, ele sobe e desce</a:t>
-            </a:r>
-            <a:r>
-              <a:rPr lang="pt-BR" dirty="0" smtClean="0"/>
+              <a:t>. Assim, ao mesmo tempo em que o objeto vai para frente, ele sobe e desce.</a:t>
+            </a:r>
+          </a:p>
+          <a:p>
+            <a:r>
+              <a:rPr lang="pt-BR" dirty="0"/>
+              <a:t>Deslocamento Vertical: o movimento executado pelo objeto na vertical, está sobe influência da </a:t>
+            </a:r>
+            <a:r>
+              <a:rPr lang="pt-BR" b="1" dirty="0"/>
+              <a:t>aceleração da gravidade</a:t>
+            </a:r>
+            <a:r>
+              <a:rPr lang="pt-BR" dirty="0"/>
+              <a:t>, formando um movimento </a:t>
+            </a:r>
+            <a:r>
+              <a:rPr lang="pt-BR" b="1" dirty="0"/>
+              <a:t>retilíneo uniformemente variado</a:t>
+            </a:r>
+            <a:r>
+              <a:rPr lang="pt-BR" dirty="0"/>
               <a:t>.</a:t>
             </a:r>
           </a:p>
           <a:p>
             <a:r>
-              <a:rPr lang="pt-BR" dirty="0" smtClean="0"/>
-              <a:t>Deslocamento Vertical: o movimento executado pelo objeto na vertical, está sobe influência da </a:t>
-            </a:r>
-            <a:r>
-              <a:rPr lang="pt-BR" b="1" dirty="0" smtClean="0"/>
-              <a:t>aceleração da gravidade</a:t>
-            </a:r>
-            <a:r>
-              <a:rPr lang="pt-BR" dirty="0" smtClean="0"/>
-              <a:t>, formando um movimento </a:t>
-            </a:r>
-            <a:r>
-              <a:rPr lang="pt-BR" b="1" dirty="0" smtClean="0"/>
-              <a:t>retilíneo uniformemente variado</a:t>
-            </a:r>
-            <a:r>
-              <a:rPr lang="pt-BR" dirty="0" smtClean="0"/>
+              <a:rPr lang="pt-BR" dirty="0"/>
+              <a:t>Deslocamento Horizontal: o movimento executado pelo objeto na vertical, não sofre influência da aceleração da gravidade, formando um movimento </a:t>
+            </a:r>
+            <a:r>
+              <a:rPr lang="pt-BR" b="1" dirty="0"/>
+              <a:t>retilíneo uniforme</a:t>
+            </a:r>
+            <a:r>
+              <a:rPr lang="pt-BR" dirty="0"/>
               <a:t>.</a:t>
             </a:r>
           </a:p>
           <a:p>
             <a:r>
-              <a:rPr lang="pt-BR" dirty="0" smtClean="0"/>
-              <a:t>Deslocamento Horizontal: </a:t>
-            </a:r>
-            <a:r>
               <a:rPr lang="pt-BR" dirty="0"/>
-              <a:t>o</a:t>
-            </a:r>
-            <a:r>
-              <a:rPr lang="pt-BR" dirty="0" smtClean="0"/>
-              <a:t> movimento executado pelo objeto na vertical, não sofre influência da aceleração da gravidade, formando um movimento </a:t>
-            </a:r>
-            <a:r>
-              <a:rPr lang="pt-BR" b="1" dirty="0" smtClean="0"/>
-              <a:t>retilíneo uniforme</a:t>
-            </a:r>
-            <a:r>
-              <a:rPr lang="pt-BR" dirty="0" smtClean="0"/>
-              <a:t>.</a:t>
-            </a:r>
-            <a:endParaRPr lang="pt-BR" dirty="0"/>
-          </a:p>
-          <a:p>
-            <a:r>
-              <a:rPr lang="pt-BR" dirty="0"/>
-              <a:t>O lançamento oblíquo ocorre quando um corpo qualquer é arremessado e forma um ângulo </a:t>
-            </a:r>
-            <a:r>
-              <a:rPr lang="pt-BR" dirty="0" smtClean="0"/>
-              <a:t>de 0 a 90 graus em </a:t>
-            </a:r>
-            <a:r>
-              <a:rPr lang="pt-BR" dirty="0"/>
-              <a:t>relação a horizontal</a:t>
-            </a:r>
-            <a:r>
-              <a:rPr lang="pt-BR" dirty="0" smtClean="0"/>
-              <a:t>.</a:t>
-            </a:r>
-            <a:endParaRPr lang="pt-BR" dirty="0"/>
+              <a:t>O lançamento oblíquo ocorre quando um corpo qualquer é arremessado e forma um ângulo de 0 a 90 graus em relação a horizontal.</a:t>
+            </a:r>
           </a:p>
           <a:p>
             <a:endParaRPr lang="pt-BR" dirty="0"/>
@@ -5575,10 +5561,9 @@
           <a:lstStyle/>
           <a:p>
             <a:r>
-              <a:rPr lang="pt-BR" dirty="0" smtClean="0"/>
+              <a:rPr lang="pt-BR" dirty="0"/>
               <a:t>Definições</a:t>
             </a:r>
-            <a:endParaRPr lang="pt-BR" dirty="0"/>
           </a:p>
         </p:txBody>
       </p:sp>
@@ -5630,24 +5615,23 @@
               <a:t>Movimento Horizontal</a:t>
             </a:r>
             <a:r>
-              <a:rPr lang="pt-BR" dirty="0" smtClean="0"/>
+              <a:rPr lang="pt-BR" dirty="0"/>
               <a:t>.</a:t>
             </a:r>
           </a:p>
           <a:p>
             <a:r>
-              <a:rPr lang="pt-BR" dirty="0" smtClean="0"/>
+              <a:rPr lang="pt-BR" dirty="0"/>
               <a:t>Também foi implementado a variável inicial </a:t>
             </a:r>
             <a:r>
-              <a:rPr lang="pt-BR" b="1" dirty="0" smtClean="0"/>
+              <a:rPr lang="pt-BR" b="1" dirty="0"/>
               <a:t>Altura Inicial</a:t>
             </a:r>
             <a:r>
-              <a:rPr lang="pt-BR" dirty="0" smtClean="0"/>
+              <a:rPr lang="pt-BR" dirty="0"/>
               <a:t>.</a:t>
             </a:r>
-            <a:endParaRPr lang="pt-BR" dirty="0"/>
           </a:p>
           <a:p>
             <a:r>
@@ -5719,7 +5703,7 @@
           <p:cNvPr id="2" name="Título 1">
             <a:extLst>
               <a:ext uri="{FF2B5EF4-FFF2-40B4-BE49-F238E27FC236}">
-                <a16:creationId xmlns:a16="http://schemas.microsoft.com/office/drawing/2014/main" xmlns="" id="{A4AC8697-A57F-4ACB-AAD8-B6C63110A3A3}"/>
+                <a16:creationId xmlns:a16="http://schemas.microsoft.com/office/drawing/2014/main" id="{A4AC8697-A57F-4ACB-AAD8-B6C63110A3A3}"/>
               </a:ext>
             </a:extLst>
           </p:cNvPr>
@@ -5747,7 +5731,7 @@
           <p:cNvPr id="3" name="Espaço Reservado para Conteúdo 2">
             <a:extLst>
               <a:ext uri="{FF2B5EF4-FFF2-40B4-BE49-F238E27FC236}">
-                <a16:creationId xmlns:a16="http://schemas.microsoft.com/office/drawing/2014/main" xmlns="" id="{63982AD1-ADEA-4142-989B-487D60700AC1}"/>
+                <a16:creationId xmlns:a16="http://schemas.microsoft.com/office/drawing/2014/main" id="{63982AD1-ADEA-4142-989B-487D60700AC1}"/>
               </a:ext>
             </a:extLst>
           </p:cNvPr>
@@ -5778,7 +5762,7 @@
           <p:cNvPr id="5" name="Imagem 4">
             <a:extLst>
               <a:ext uri="{FF2B5EF4-FFF2-40B4-BE49-F238E27FC236}">
-                <a16:creationId xmlns:a16="http://schemas.microsoft.com/office/drawing/2014/main" xmlns="" id="{5500B91E-E95E-4FDA-972A-4786CD65BD36}"/>
+                <a16:creationId xmlns:a16="http://schemas.microsoft.com/office/drawing/2014/main" id="{5500B91E-E95E-4FDA-972A-4786CD65BD36}"/>
               </a:ext>
             </a:extLst>
           </p:cNvPr>
@@ -5844,7 +5828,7 @@
           <p:cNvPr id="2" name="Título 1">
             <a:extLst>
               <a:ext uri="{FF2B5EF4-FFF2-40B4-BE49-F238E27FC236}">
-                <a16:creationId xmlns:a16="http://schemas.microsoft.com/office/drawing/2014/main" xmlns="" id="{8CC43F10-156A-4375-A25E-590C555C751B}"/>
+                <a16:creationId xmlns:a16="http://schemas.microsoft.com/office/drawing/2014/main" id="{8CC43F10-156A-4375-A25E-590C555C751B}"/>
               </a:ext>
             </a:extLst>
           </p:cNvPr>
@@ -5872,7 +5856,7 @@
           <p:cNvPr id="3" name="Espaço Reservado para Conteúdo 2">
             <a:extLst>
               <a:ext uri="{FF2B5EF4-FFF2-40B4-BE49-F238E27FC236}">
-                <a16:creationId xmlns:a16="http://schemas.microsoft.com/office/drawing/2014/main" xmlns="" id="{3A3EC19A-56FC-4EF9-BFBF-7A2776C422BA}"/>
+                <a16:creationId xmlns:a16="http://schemas.microsoft.com/office/drawing/2014/main" id="{3A3EC19A-56FC-4EF9-BFBF-7A2776C422BA}"/>
               </a:ext>
             </a:extLst>
           </p:cNvPr>
@@ -5890,38 +5874,17 @@
           <a:p>
             <a:r>
               <a:rPr lang="pt-BR" dirty="0"/>
-              <a:t>Primeiro </a:t>
-            </a:r>
-            <a:r>
-              <a:rPr lang="pt-BR" dirty="0" smtClean="0"/>
-              <a:t>é definido os valores iniciais Ângulo, Velocidade </a:t>
-            </a:r>
-            <a:r>
-              <a:rPr lang="pt-BR" dirty="0" smtClean="0"/>
-              <a:t>I</a:t>
-            </a:r>
-            <a:r>
-              <a:rPr lang="pt-BR" dirty="0" smtClean="0"/>
-              <a:t>nicial e Altura, </a:t>
-            </a:r>
-            <a:r>
-              <a:rPr lang="pt-BR" dirty="0"/>
-              <a:t>conforme a figura </a:t>
-            </a:r>
-            <a:r>
-              <a:rPr lang="pt-BR" dirty="0" smtClean="0"/>
-              <a:t>a seguir:</a:t>
-            </a:r>
-            <a:endParaRPr lang="pt-BR" dirty="0"/>
+              <a:t>Primeiro é definido os valores iniciais Ângulo, Velocidade Inicial e Altura, também podemos definir a gravidade, simulando assim um ambiente com uma gravidade diferente da terra conforme a figura a seguir:</a:t>
+            </a:r>
           </a:p>
         </p:txBody>
       </p:sp>
       <p:pic>
         <p:nvPicPr>
-          <p:cNvPr id="7" name="Imagem 6">
-            <a:extLst>
-              <a:ext uri="{FF2B5EF4-FFF2-40B4-BE49-F238E27FC236}">
-                <a16:creationId xmlns:a16="http://schemas.microsoft.com/office/drawing/2014/main" xmlns="" id="{9078B552-F228-4AAA-873B-824CD1D20705}"/>
+          <p:cNvPr id="5" name="Imagem 4">
+            <a:extLst>
+              <a:ext uri="{FF2B5EF4-FFF2-40B4-BE49-F238E27FC236}">
+                <a16:creationId xmlns:a16="http://schemas.microsoft.com/office/drawing/2014/main" id="{4F68C7BB-2DE3-466A-BAAD-533EB89B5352}"/>
               </a:ext>
             </a:extLst>
           </p:cNvPr>
@@ -5944,8 +5907,8 @@
         </p:blipFill>
         <p:spPr>
           <a:xfrm>
-            <a:off x="3028804" y="3670374"/>
-            <a:ext cx="5849166" cy="1648055"/>
+            <a:off x="2518593" y="3977383"/>
+            <a:ext cx="7154813" cy="2199580"/>
           </a:xfrm>
           <a:prstGeom prst="rect">
             <a:avLst/>

</xml_diff>